<commit_message>
UML en Presentatie aangepast
Ik heb het UML bestand wat aangepast, heb de proxies toegevoegd en
planten bewerkt. Heb bij presentaties de UML ingestopt weet niet of het
zo goed is maar hoor het waarschijnlijk morgen wel
</commit_message>
<xml_diff>
--- a/Presentatie/1. Concept Art Fase/Presentatie Concept Fase.pptx
+++ b/Presentatie/1. Concept Art Fase/Presentatie Concept Fase.pptx
@@ -10,13 +10,17 @@
     <p:sldId id="267" r:id="rId4"/>
     <p:sldId id="258" r:id="rId5"/>
     <p:sldId id="259" r:id="rId6"/>
-    <p:sldId id="260" r:id="rId7"/>
-    <p:sldId id="261" r:id="rId8"/>
-    <p:sldId id="262" r:id="rId9"/>
-    <p:sldId id="263" r:id="rId10"/>
-    <p:sldId id="264" r:id="rId11"/>
-    <p:sldId id="265" r:id="rId12"/>
-    <p:sldId id="266" r:id="rId13"/>
+    <p:sldId id="270" r:id="rId7"/>
+    <p:sldId id="268" r:id="rId8"/>
+    <p:sldId id="260" r:id="rId9"/>
+    <p:sldId id="271" r:id="rId10"/>
+    <p:sldId id="261" r:id="rId11"/>
+    <p:sldId id="262" r:id="rId12"/>
+    <p:sldId id="263" r:id="rId13"/>
+    <p:sldId id="273" r:id="rId14"/>
+    <p:sldId id="264" r:id="rId15"/>
+    <p:sldId id="265" r:id="rId16"/>
+    <p:sldId id="266" r:id="rId17"/>
   </p:sldIdLst>
   <p:sldSz cx="12192000" cy="6858000"/>
   <p:notesSz cx="6858000" cy="9144000"/>
@@ -352,7 +356,7 @@
           <a:p>
             <a:fld id="{1087F47F-40DD-451D-B02B-62F7F35B7CBC}" type="datetimeFigureOut">
               <a:rPr lang="nl-NL" smtClean="0"/>
-              <a:t>8-2-2016</a:t>
+              <a:t>16-2-2016</a:t>
             </a:fld>
             <a:endParaRPr lang="nl-NL"/>
           </a:p>
@@ -686,7 +690,7 @@
           <a:p>
             <a:fld id="{1087F47F-40DD-451D-B02B-62F7F35B7CBC}" type="datetimeFigureOut">
               <a:rPr lang="nl-NL" smtClean="0"/>
-              <a:t>8-2-2016</a:t>
+              <a:t>16-2-2016</a:t>
             </a:fld>
             <a:endParaRPr lang="nl-NL"/>
           </a:p>
@@ -964,7 +968,7 @@
           <a:p>
             <a:fld id="{1087F47F-40DD-451D-B02B-62F7F35B7CBC}" type="datetimeFigureOut">
               <a:rPr lang="nl-NL" smtClean="0"/>
-              <a:t>8-2-2016</a:t>
+              <a:t>16-2-2016</a:t>
             </a:fld>
             <a:endParaRPr lang="nl-NL"/>
           </a:p>
@@ -1532,7 +1536,7 @@
           <a:p>
             <a:fld id="{1087F47F-40DD-451D-B02B-62F7F35B7CBC}" type="datetimeFigureOut">
               <a:rPr lang="nl-NL" smtClean="0"/>
-              <a:t>8-2-2016</a:t>
+              <a:t>16-2-2016</a:t>
             </a:fld>
             <a:endParaRPr lang="nl-NL"/>
           </a:p>
@@ -1810,7 +1814,7 @@
           <a:p>
             <a:fld id="{1087F47F-40DD-451D-B02B-62F7F35B7CBC}" type="datetimeFigureOut">
               <a:rPr lang="nl-NL" smtClean="0"/>
-              <a:t>8-2-2016</a:t>
+              <a:t>16-2-2016</a:t>
             </a:fld>
             <a:endParaRPr lang="nl-NL"/>
           </a:p>
@@ -2372,7 +2376,7 @@
           <a:p>
             <a:fld id="{1087F47F-40DD-451D-B02B-62F7F35B7CBC}" type="datetimeFigureOut">
               <a:rPr lang="nl-NL" smtClean="0"/>
-              <a:t>8-2-2016</a:t>
+              <a:t>16-2-2016</a:t>
             </a:fld>
             <a:endParaRPr lang="nl-NL"/>
           </a:p>
@@ -2699,7 +2703,7 @@
           <a:p>
             <a:fld id="{1087F47F-40DD-451D-B02B-62F7F35B7CBC}" type="datetimeFigureOut">
               <a:rPr lang="nl-NL" smtClean="0"/>
-              <a:t>8-2-2016</a:t>
+              <a:t>16-2-2016</a:t>
             </a:fld>
             <a:endParaRPr lang="nl-NL"/>
           </a:p>
@@ -2876,7 +2880,7 @@
           <a:p>
             <a:fld id="{1087F47F-40DD-451D-B02B-62F7F35B7CBC}" type="datetimeFigureOut">
               <a:rPr lang="nl-NL" smtClean="0"/>
-              <a:t>8-2-2016</a:t>
+              <a:t>16-2-2016</a:t>
             </a:fld>
             <a:endParaRPr lang="nl-NL"/>
           </a:p>
@@ -3114,7 +3118,7 @@
           <a:p>
             <a:fld id="{1087F47F-40DD-451D-B02B-62F7F35B7CBC}" type="datetimeFigureOut">
               <a:rPr lang="nl-NL" smtClean="0"/>
-              <a:t>8-2-2016</a:t>
+              <a:t>16-2-2016</a:t>
             </a:fld>
             <a:endParaRPr lang="nl-NL"/>
           </a:p>
@@ -3314,7 +3318,7 @@
           <a:p>
             <a:fld id="{1087F47F-40DD-451D-B02B-62F7F35B7CBC}" type="datetimeFigureOut">
               <a:rPr lang="nl-NL" smtClean="0"/>
-              <a:t>8-2-2016</a:t>
+              <a:t>16-2-2016</a:t>
             </a:fld>
             <a:endParaRPr lang="nl-NL"/>
           </a:p>
@@ -3590,7 +3594,7 @@
           <a:p>
             <a:fld id="{1087F47F-40DD-451D-B02B-62F7F35B7CBC}" type="datetimeFigureOut">
               <a:rPr lang="nl-NL" smtClean="0"/>
-              <a:t>8-2-2016</a:t>
+              <a:t>16-2-2016</a:t>
             </a:fld>
             <a:endParaRPr lang="nl-NL"/>
           </a:p>
@@ -3856,7 +3860,7 @@
           <a:p>
             <a:fld id="{1087F47F-40DD-451D-B02B-62F7F35B7CBC}" type="datetimeFigureOut">
               <a:rPr lang="nl-NL" smtClean="0"/>
-              <a:t>8-2-2016</a:t>
+              <a:t>16-2-2016</a:t>
             </a:fld>
             <a:endParaRPr lang="nl-NL"/>
           </a:p>
@@ -4230,7 +4234,7 @@
           <a:p>
             <a:fld id="{1087F47F-40DD-451D-B02B-62F7F35B7CBC}" type="datetimeFigureOut">
               <a:rPr lang="nl-NL" smtClean="0"/>
-              <a:t>8-2-2016</a:t>
+              <a:t>16-2-2016</a:t>
             </a:fld>
             <a:endParaRPr lang="nl-NL"/>
           </a:p>
@@ -4378,7 +4382,7 @@
           <a:p>
             <a:fld id="{1087F47F-40DD-451D-B02B-62F7F35B7CBC}" type="datetimeFigureOut">
               <a:rPr lang="nl-NL" smtClean="0"/>
-              <a:t>8-2-2016</a:t>
+              <a:t>16-2-2016</a:t>
             </a:fld>
             <a:endParaRPr lang="nl-NL"/>
           </a:p>
@@ -4503,7 +4507,7 @@
           <a:p>
             <a:fld id="{1087F47F-40DD-451D-B02B-62F7F35B7CBC}" type="datetimeFigureOut">
               <a:rPr lang="nl-NL" smtClean="0"/>
-              <a:t>8-2-2016</a:t>
+              <a:t>16-2-2016</a:t>
             </a:fld>
             <a:endParaRPr lang="nl-NL"/>
           </a:p>
@@ -4788,7 +4792,7 @@
           <a:p>
             <a:fld id="{1087F47F-40DD-451D-B02B-62F7F35B7CBC}" type="datetimeFigureOut">
               <a:rPr lang="nl-NL" smtClean="0"/>
-              <a:t>8-2-2016</a:t>
+              <a:t>16-2-2016</a:t>
             </a:fld>
             <a:endParaRPr lang="nl-NL"/>
           </a:p>
@@ -5112,7 +5116,7 @@
           <a:p>
             <a:fld id="{1087F47F-40DD-451D-B02B-62F7F35B7CBC}" type="datetimeFigureOut">
               <a:rPr lang="nl-NL" smtClean="0"/>
-              <a:t>8-2-2016</a:t>
+              <a:t>16-2-2016</a:t>
             </a:fld>
             <a:endParaRPr lang="nl-NL"/>
           </a:p>
@@ -5326,7 +5330,7 @@
           <a:p>
             <a:fld id="{1087F47F-40DD-451D-B02B-62F7F35B7CBC}" type="datetimeFigureOut">
               <a:rPr lang="nl-NL" smtClean="0"/>
-              <a:t>8-2-2016</a:t>
+              <a:t>16-2-2016</a:t>
             </a:fld>
             <a:endParaRPr lang="nl-NL"/>
           </a:p>
@@ -5960,6 +5964,13 @@
   <p:clrMapOvr>
     <a:masterClrMapping/>
   </p:clrMapOvr>
+  <p:timing>
+    <p:tnLst>
+      <p:par>
+        <p:cTn id="1" dur="indefinite" restart="never" nodeType="tmRoot"/>
+      </p:par>
+    </p:tnLst>
+  </p:timing>
 </p:sld>
 </file>
 
@@ -5998,7 +6009,7 @@
             <a:pPr algn="ctr"/>
             <a:r>
               <a:rPr lang="nl-NL" sz="6600" dirty="0" smtClean="0"/>
-              <a:t>UX / Leveldesign</a:t>
+              <a:t>Creativiteit</a:t>
             </a:r>
             <a:endParaRPr lang="nl-NL" sz="6600" dirty="0"/>
           </a:p>
@@ -6022,49 +6033,31 @@
           <a:lstStyle/>
           <a:p>
             <a:r>
+              <a:rPr lang="nl-NL" sz="2000" dirty="0"/>
+              <a:t>Creativiteit En Vindingrijkheid</a:t>
+            </a:r>
+          </a:p>
+          <a:p>
+            <a:r>
+              <a:rPr lang="nl-NL" sz="2000" dirty="0"/>
+              <a:t>Puzzle </a:t>
+            </a:r>
+            <a:r>
               <a:rPr lang="nl-NL" sz="2000" dirty="0" smtClean="0"/>
-              <a:t>Uitleg </a:t>
-            </a:r>
-            <a:r>
-              <a:rPr lang="nl-NL" sz="2000" dirty="0" err="1" smtClean="0"/>
-              <a:t>Zone’s</a:t>
-            </a:r>
+              <a:t>Uitleg</a:t>
+            </a:r>
+          </a:p>
+          <a:p>
+            <a:endParaRPr lang="nl-NL" sz="2000" dirty="0"/>
+          </a:p>
+          <a:p>
             <a:endParaRPr lang="nl-NL" sz="2000" dirty="0" smtClean="0"/>
           </a:p>
           <a:p>
-            <a:r>
-              <a:rPr lang="nl-NL" sz="2000" dirty="0" smtClean="0"/>
-              <a:t>Uitleg Puzzle</a:t>
-            </a:r>
-          </a:p>
-          <a:p>
-            <a:r>
-              <a:rPr lang="nl-NL" sz="2000" dirty="0" smtClean="0"/>
-              <a:t>Uitleg Fun </a:t>
-            </a:r>
-            <a:r>
-              <a:rPr lang="nl-NL" sz="2000" dirty="0" err="1" smtClean="0"/>
-              <a:t>To</a:t>
-            </a:r>
-            <a:r>
-              <a:rPr lang="nl-NL" sz="2000" dirty="0" smtClean="0"/>
-              <a:t> Play Factor</a:t>
-            </a:r>
-          </a:p>
-          <a:p>
-            <a:r>
-              <a:rPr lang="nl-NL" sz="2000" dirty="0" smtClean="0"/>
-              <a:t>Uitleg User Interface</a:t>
-            </a:r>
-          </a:p>
-          <a:p>
-            <a:r>
-              <a:rPr lang="nl-NL" sz="2000" dirty="0" smtClean="0"/>
-              <a:t>Uitleg Gameflow Van Begin Tot Eind</a:t>
-            </a:r>
-          </a:p>
-          <a:p>
             <a:endParaRPr lang="nl-NL" sz="2000" dirty="0"/>
+          </a:p>
+          <a:p>
+            <a:endParaRPr lang="nl-NL" sz="2000" dirty="0" smtClean="0"/>
           </a:p>
           <a:p>
             <a:endParaRPr lang="nl-NL" sz="2000" dirty="0"/>
@@ -6077,13 +6070,20 @@
     </p:spTree>
     <p:extLst>
       <p:ext uri="{BB962C8B-B14F-4D97-AF65-F5344CB8AC3E}">
-        <p14:creationId xmlns:p14="http://schemas.microsoft.com/office/powerpoint/2010/main" val="2608330237"/>
+        <p14:creationId xmlns:p14="http://schemas.microsoft.com/office/powerpoint/2010/main" val="3735039959"/>
       </p:ext>
     </p:extLst>
   </p:cSld>
   <p:clrMapOvr>
     <a:masterClrMapping/>
   </p:clrMapOvr>
+  <p:timing>
+    <p:tnLst>
+      <p:par>
+        <p:cTn id="1" dur="indefinite" restart="never" nodeType="tmRoot"/>
+      </p:par>
+    </p:tnLst>
+  </p:timing>
 </p:sld>
 </file>
 
@@ -6122,7 +6122,7 @@
             <a:pPr algn="ctr"/>
             <a:r>
               <a:rPr lang="nl-NL" sz="6600" dirty="0" smtClean="0"/>
-              <a:t>Scripting</a:t>
+              <a:t>Art Style</a:t>
             </a:r>
             <a:endParaRPr lang="nl-NL" sz="6600" dirty="0"/>
           </a:p>
@@ -6146,21 +6146,41 @@
           <a:lstStyle/>
           <a:p>
             <a:r>
+              <a:rPr lang="en-US" sz="2000" dirty="0" smtClean="0"/>
+              <a:t>All Art</a:t>
+            </a:r>
+          </a:p>
+          <a:p>
+            <a:r>
+              <a:rPr lang="en-US" sz="2000" dirty="0" smtClean="0"/>
+              <a:t>Pre-</a:t>
+            </a:r>
+            <a:r>
+              <a:rPr lang="en-US" sz="2000" dirty="0" err="1" smtClean="0"/>
+              <a:t>productie</a:t>
+            </a:r>
+            <a:endParaRPr lang="en-US" sz="2000" dirty="0" smtClean="0"/>
+          </a:p>
+          <a:p>
+            <a:r>
+              <a:rPr lang="en-US" sz="2000" dirty="0" smtClean="0"/>
+              <a:t>A3 map </a:t>
+            </a:r>
+            <a:r>
+              <a:rPr lang="en-US" sz="2000" dirty="0" err="1" smtClean="0"/>
+              <a:t>uitleg</a:t>
+            </a:r>
+            <a:endParaRPr lang="nl-NL" sz="2000" dirty="0" smtClean="0"/>
+          </a:p>
+          <a:p>
+            <a:r>
               <a:rPr lang="nl-NL" sz="2000" dirty="0" smtClean="0"/>
-              <a:t>Schematisch overzicht van de op te leveren code (Asset-List van de scripts)</a:t>
-            </a:r>
-          </a:p>
-          <a:p>
+              <a:t>Onderbouwing </a:t>
+            </a:r>
             <a:r>
               <a:rPr lang="nl-NL" sz="2000" dirty="0" smtClean="0"/>
-              <a:t>Structuur Uitleg (UML)</a:t>
-            </a:r>
-          </a:p>
-          <a:p>
-            <a:endParaRPr lang="nl-NL" sz="2000" dirty="0"/>
-          </a:p>
-          <a:p>
-            <a:endParaRPr lang="nl-NL" sz="2000" dirty="0" smtClean="0"/>
+              <a:t>Keuzen</a:t>
+            </a:r>
           </a:p>
           <a:p>
             <a:endParaRPr lang="nl-NL" sz="2000" dirty="0"/>
@@ -6179,13 +6199,20 @@
     </p:spTree>
     <p:extLst>
       <p:ext uri="{BB962C8B-B14F-4D97-AF65-F5344CB8AC3E}">
-        <p14:creationId xmlns:p14="http://schemas.microsoft.com/office/powerpoint/2010/main" val="283113134"/>
+        <p14:creationId xmlns:p14="http://schemas.microsoft.com/office/powerpoint/2010/main" val="2097265463"/>
       </p:ext>
     </p:extLst>
   </p:cSld>
   <p:clrMapOvr>
     <a:masterClrMapping/>
   </p:clrMapOvr>
+  <p:timing>
+    <p:tnLst>
+      <p:par>
+        <p:cTn id="1" dur="indefinite" restart="never" nodeType="tmRoot"/>
+      </p:par>
+    </p:tnLst>
+  </p:timing>
 </p:sld>
 </file>
 
@@ -6223,8 +6250,8 @@
           <a:p>
             <a:pPr algn="ctr"/>
             <a:r>
-              <a:rPr lang="nl-NL" sz="6600" dirty="0" smtClean="0"/>
-              <a:t>Doel </a:t>
+              <a:rPr lang="nl-NL" sz="6600" dirty="0" err="1" smtClean="0"/>
+              <a:t>BackLog</a:t>
             </a:r>
             <a:endParaRPr lang="nl-NL" sz="6600" dirty="0"/>
           </a:p>
@@ -6248,33 +6275,1014 @@
           <a:lstStyle/>
           <a:p>
             <a:r>
+              <a:rPr lang="nl-NL" sz="2000" dirty="0" err="1" smtClean="0"/>
+              <a:t>Backlog</a:t>
+            </a:r>
+            <a:r>
               <a:rPr lang="nl-NL" sz="2000" dirty="0" smtClean="0"/>
-              <a:t>Uitleg Van Het Doel Einde Project</a:t>
-            </a:r>
-          </a:p>
+              <a:t> (Asset-List)</a:t>
+            </a:r>
+          </a:p>
+          <a:p>
+            <a:r>
+              <a:rPr lang="nl-NL" sz="2000" dirty="0" smtClean="0"/>
+              <a:t>Asset-List Met </a:t>
+            </a:r>
+            <a:r>
+              <a:rPr lang="nl-NL" sz="2000" dirty="0" smtClean="0"/>
+              <a:t>Tijdsinschatting</a:t>
+            </a:r>
+            <a:endParaRPr lang="nl-NL" sz="2000" dirty="0"/>
+          </a:p>
+          <a:p>
+            <a:endParaRPr lang="nl-NL" sz="2000" dirty="0" smtClean="0"/>
+          </a:p>
+          <a:p>
+            <a:endParaRPr lang="nl-NL" sz="2000" dirty="0"/>
+          </a:p>
+          <a:p>
+            <a:endParaRPr lang="nl-NL" sz="2000" dirty="0"/>
+          </a:p>
+        </p:txBody>
+      </p:sp>
+    </p:spTree>
+    <p:extLst>
+      <p:ext uri="{BB962C8B-B14F-4D97-AF65-F5344CB8AC3E}">
+        <p14:creationId xmlns:p14="http://schemas.microsoft.com/office/powerpoint/2010/main" val="3671801935"/>
+      </p:ext>
+    </p:extLst>
+  </p:cSld>
+  <p:clrMapOvr>
+    <a:masterClrMapping/>
+  </p:clrMapOvr>
+  <p:timing>
+    <p:tnLst>
+      <p:par>
+        <p:cTn id="1" dur="indefinite" restart="never" nodeType="tmRoot"/>
+      </p:par>
+    </p:tnLst>
+  </p:timing>
+</p:sld>
+</file>
+
+<file path=ppt/slides/slide13.xml><?xml version="1.0" encoding="utf-8"?>
+<p:sld xmlns:a="http://schemas.openxmlformats.org/drawingml/2006/main" xmlns:r="http://schemas.openxmlformats.org/officeDocument/2006/relationships" xmlns:p="http://schemas.openxmlformats.org/presentationml/2006/main">
+  <p:cSld>
+    <p:spTree>
+      <p:nvGrpSpPr>
+        <p:cNvPr id="1" name=""/>
+        <p:cNvGrpSpPr/>
+        <p:nvPr/>
+      </p:nvGrpSpPr>
+      <p:grpSpPr>
+        <a:xfrm>
+          <a:off x="0" y="0"/>
+          <a:ext cx="0" cy="0"/>
+          <a:chOff x="0" y="0"/>
+          <a:chExt cx="0" cy="0"/>
+        </a:xfrm>
+      </p:grpSpPr>
+      <p:sp>
+        <p:nvSpPr>
+          <p:cNvPr id="2" name="Titel 1"/>
+          <p:cNvSpPr>
+            <a:spLocks noGrp="1"/>
+          </p:cNvSpPr>
+          <p:nvPr>
+            <p:ph type="title"/>
+          </p:nvPr>
+        </p:nvSpPr>
+        <p:spPr/>
+        <p:txBody>
+          <a:bodyPr>
+            <a:normAutofit/>
+          </a:bodyPr>
+          <a:lstStyle/>
+          <a:p>
+            <a:pPr algn="ctr"/>
+            <a:r>
+              <a:rPr lang="nl-NL" sz="6600" dirty="0" smtClean="0"/>
+              <a:t>Trello</a:t>
+            </a:r>
+            <a:endParaRPr lang="nl-NL" sz="6600" dirty="0"/>
+          </a:p>
+        </p:txBody>
+      </p:sp>
+      <p:sp>
+        <p:nvSpPr>
+          <p:cNvPr id="3" name="Tijdelijke aanduiding voor inhoud 2"/>
+          <p:cNvSpPr>
+            <a:spLocks noGrp="1"/>
+          </p:cNvSpPr>
+          <p:nvPr>
+            <p:ph idx="1"/>
+          </p:nvPr>
+        </p:nvSpPr>
+        <p:spPr/>
+        <p:txBody>
+          <a:bodyPr>
+            <a:normAutofit/>
+          </a:bodyPr>
+          <a:lstStyle/>
+          <a:p>
+            <a:r>
+              <a:rPr lang="nl-NL" sz="2000" dirty="0" smtClean="0"/>
+              <a:t>Planning </a:t>
+            </a:r>
+            <a:r>
+              <a:rPr lang="nl-NL" sz="2000" dirty="0" smtClean="0"/>
+              <a:t>in Trello</a:t>
+            </a:r>
+          </a:p>
+          <a:p>
+            <a:r>
+              <a:rPr lang="nl-NL" sz="2000" dirty="0" smtClean="0"/>
+              <a:t>Uitleg Taakverdeling</a:t>
+            </a:r>
+          </a:p>
+          <a:p>
+            <a:endParaRPr lang="nl-NL" sz="2000" dirty="0"/>
+          </a:p>
+          <a:p>
+            <a:endParaRPr lang="nl-NL" sz="2000" dirty="0" smtClean="0"/>
+          </a:p>
+          <a:p>
+            <a:endParaRPr lang="nl-NL" sz="2000" dirty="0"/>
+          </a:p>
+          <a:p>
+            <a:endParaRPr lang="nl-NL" sz="2000" dirty="0"/>
+          </a:p>
+        </p:txBody>
+      </p:sp>
+    </p:spTree>
+    <p:extLst>
+      <p:ext uri="{BB962C8B-B14F-4D97-AF65-F5344CB8AC3E}">
+        <p14:creationId xmlns:p14="http://schemas.microsoft.com/office/powerpoint/2010/main" val="858768554"/>
+      </p:ext>
+    </p:extLst>
+  </p:cSld>
+  <p:clrMapOvr>
+    <a:masterClrMapping/>
+  </p:clrMapOvr>
+  <p:timing>
+    <p:tnLst>
+      <p:par>
+        <p:cTn id="1" dur="indefinite" restart="never" nodeType="tmRoot"/>
+      </p:par>
+    </p:tnLst>
+  </p:timing>
+</p:sld>
+</file>
+
+<file path=ppt/slides/slide14.xml><?xml version="1.0" encoding="utf-8"?>
+<p:sld xmlns:a="http://schemas.openxmlformats.org/drawingml/2006/main" xmlns:r="http://schemas.openxmlformats.org/officeDocument/2006/relationships" xmlns:p="http://schemas.openxmlformats.org/presentationml/2006/main">
+  <p:cSld>
+    <p:spTree>
+      <p:nvGrpSpPr>
+        <p:cNvPr id="1" name=""/>
+        <p:cNvGrpSpPr/>
+        <p:nvPr/>
+      </p:nvGrpSpPr>
+      <p:grpSpPr>
+        <a:xfrm>
+          <a:off x="0" y="0"/>
+          <a:ext cx="0" cy="0"/>
+          <a:chOff x="0" y="0"/>
+          <a:chExt cx="0" cy="0"/>
+        </a:xfrm>
+      </p:grpSpPr>
+      <p:sp>
+        <p:nvSpPr>
+          <p:cNvPr id="2" name="Titel 1"/>
+          <p:cNvSpPr>
+            <a:spLocks noGrp="1"/>
+          </p:cNvSpPr>
+          <p:nvPr>
+            <p:ph type="title"/>
+          </p:nvPr>
+        </p:nvSpPr>
+        <p:spPr/>
+        <p:txBody>
+          <a:bodyPr/>
+          <a:lstStyle/>
+          <a:p>
+            <a:pPr algn="ctr"/>
+            <a:r>
+              <a:rPr lang="nl-NL" sz="6600" dirty="0" smtClean="0"/>
+              <a:t>UX / Leveldesign</a:t>
+            </a:r>
+            <a:endParaRPr lang="nl-NL" sz="6600" dirty="0"/>
+          </a:p>
+        </p:txBody>
+      </p:sp>
+      <p:sp>
+        <p:nvSpPr>
+          <p:cNvPr id="3" name="Tijdelijke aanduiding voor inhoud 2"/>
+          <p:cNvSpPr>
+            <a:spLocks noGrp="1"/>
+          </p:cNvSpPr>
+          <p:nvPr>
+            <p:ph idx="1"/>
+          </p:nvPr>
+        </p:nvSpPr>
+        <p:spPr/>
+        <p:txBody>
+          <a:bodyPr>
+            <a:normAutofit/>
+          </a:bodyPr>
+          <a:lstStyle/>
           <a:p>
             <a:r>
               <a:rPr lang="nl-NL" sz="2000" dirty="0" smtClean="0"/>
               <a:t>Uitleg </a:t>
             </a:r>
             <a:r>
+              <a:rPr lang="nl-NL" sz="2000" dirty="0" smtClean="0"/>
+              <a:t>Zones</a:t>
+            </a:r>
+            <a:endParaRPr lang="nl-NL" sz="2000" dirty="0" smtClean="0"/>
+          </a:p>
+          <a:p>
+            <a:r>
+              <a:rPr lang="nl-NL" sz="2000" dirty="0" smtClean="0"/>
+              <a:t>Uitleg Puzzle</a:t>
+            </a:r>
+          </a:p>
+          <a:p>
+            <a:r>
+              <a:rPr lang="nl-NL" sz="2000" dirty="0" smtClean="0"/>
+              <a:t>Uitleg Fun </a:t>
+            </a:r>
+            <a:r>
               <a:rPr lang="nl-NL" sz="2000" dirty="0" err="1" smtClean="0"/>
-              <a:t>Protoype</a:t>
+              <a:t>To</a:t>
             </a:r>
             <a:r>
               <a:rPr lang="nl-NL" sz="2000" dirty="0" smtClean="0"/>
-              <a:t> (</a:t>
-            </a:r>
-            <a:r>
-              <a:rPr lang="nl-NL" sz="2000" dirty="0" err="1" smtClean="0"/>
-              <a:t>Dev</a:t>
-            </a:r>
+              <a:t> Play Factor</a:t>
+            </a:r>
+          </a:p>
+          <a:p>
             <a:r>
               <a:rPr lang="nl-NL" sz="2000" dirty="0" smtClean="0"/>
-              <a:t> Fase 1)</a:t>
-            </a:r>
-          </a:p>
-          <a:p>
+              <a:t>Uitleg User Interface</a:t>
+            </a:r>
+          </a:p>
+          <a:p>
+            <a:r>
+              <a:rPr lang="nl-NL" sz="2000" dirty="0" smtClean="0"/>
+              <a:t>Uitleg Gameflow Van Begin Tot </a:t>
+            </a:r>
+            <a:r>
+              <a:rPr lang="nl-NL" sz="2000" dirty="0" smtClean="0"/>
+              <a:t>Eind</a:t>
+            </a:r>
+          </a:p>
+          <a:p>
+            <a:r>
+              <a:rPr lang="en-US" sz="2000" dirty="0" err="1" smtClean="0"/>
+              <a:t>Uitleg</a:t>
+            </a:r>
+            <a:r>
+              <a:rPr lang="en-US" sz="2000" dirty="0" smtClean="0"/>
+              <a:t> enemies </a:t>
+            </a:r>
+            <a:r>
+              <a:rPr lang="en-US" sz="2000" dirty="0" err="1" smtClean="0"/>
+              <a:t>en</a:t>
+            </a:r>
+            <a:r>
+              <a:rPr lang="en-US" sz="2000" dirty="0" smtClean="0"/>
+              <a:t> </a:t>
+            </a:r>
+            <a:r>
+              <a:rPr lang="en-US" sz="2000" dirty="0" err="1" smtClean="0"/>
+              <a:t>wapens</a:t>
+            </a:r>
+            <a:r>
+              <a:rPr lang="en-US" sz="2000" dirty="0" smtClean="0"/>
+              <a:t> (diverse </a:t>
+            </a:r>
+            <a:r>
+              <a:rPr lang="en-US" sz="2000" dirty="0" err="1" smtClean="0"/>
+              <a:t>ammo,etc</a:t>
+            </a:r>
+            <a:r>
+              <a:rPr lang="en-US" sz="2000" dirty="0" smtClean="0"/>
+              <a:t>.)</a:t>
+            </a:r>
+            <a:endParaRPr lang="nl-NL" sz="2000" dirty="0"/>
+          </a:p>
+          <a:p>
+            <a:endParaRPr lang="nl-NL" sz="2000" dirty="0"/>
+          </a:p>
+          <a:p>
+            <a:endParaRPr lang="nl-NL" sz="2000" dirty="0"/>
+          </a:p>
+        </p:txBody>
+      </p:sp>
+    </p:spTree>
+    <p:extLst>
+      <p:ext uri="{BB962C8B-B14F-4D97-AF65-F5344CB8AC3E}">
+        <p14:creationId xmlns:p14="http://schemas.microsoft.com/office/powerpoint/2010/main" val="2608330237"/>
+      </p:ext>
+    </p:extLst>
+  </p:cSld>
+  <p:clrMapOvr>
+    <a:masterClrMapping/>
+  </p:clrMapOvr>
+  <p:timing>
+    <p:tnLst>
+      <p:par>
+        <p:cTn id="1" dur="indefinite" restart="never" nodeType="tmRoot"/>
+      </p:par>
+    </p:tnLst>
+  </p:timing>
+</p:sld>
+</file>
+
+<file path=ppt/slides/slide15.xml><?xml version="1.0" encoding="utf-8"?>
+<p:sld xmlns:a="http://schemas.openxmlformats.org/drawingml/2006/main" xmlns:r="http://schemas.openxmlformats.org/officeDocument/2006/relationships" xmlns:p="http://schemas.openxmlformats.org/presentationml/2006/main">
+  <p:cSld>
+    <p:spTree>
+      <p:nvGrpSpPr>
+        <p:cNvPr id="1" name=""/>
+        <p:cNvGrpSpPr/>
+        <p:nvPr/>
+      </p:nvGrpSpPr>
+      <p:grpSpPr>
+        <a:xfrm>
+          <a:off x="0" y="0"/>
+          <a:ext cx="0" cy="0"/>
+          <a:chOff x="0" y="0"/>
+          <a:chExt cx="0" cy="0"/>
+        </a:xfrm>
+      </p:grpSpPr>
+      <p:sp>
+        <p:nvSpPr>
+          <p:cNvPr id="2" name="Titel 1"/>
+          <p:cNvSpPr>
+            <a:spLocks noGrp="1"/>
+          </p:cNvSpPr>
+          <p:nvPr>
+            <p:ph type="title"/>
+          </p:nvPr>
+        </p:nvSpPr>
+        <p:spPr/>
+        <p:txBody>
+          <a:bodyPr/>
+          <a:lstStyle/>
+          <a:p>
+            <a:pPr algn="ctr"/>
+            <a:r>
+              <a:rPr lang="nl-NL" sz="6600" dirty="0" smtClean="0"/>
+              <a:t>Scripting</a:t>
+            </a:r>
+            <a:endParaRPr lang="nl-NL" sz="6600" dirty="0"/>
+          </a:p>
+        </p:txBody>
+      </p:sp>
+      <p:sp>
+        <p:nvSpPr>
+          <p:cNvPr id="3" name="Tijdelijke aanduiding voor inhoud 2"/>
+          <p:cNvSpPr>
+            <a:spLocks noGrp="1"/>
+          </p:cNvSpPr>
+          <p:nvPr>
+            <p:ph idx="1"/>
+          </p:nvPr>
+        </p:nvSpPr>
+        <p:spPr/>
+        <p:txBody>
+          <a:bodyPr>
+            <a:normAutofit/>
+          </a:bodyPr>
+          <a:lstStyle/>
+          <a:p>
+            <a:pPr marL="0" indent="0">
+              <a:buNone/>
+            </a:pPr>
+            <a:endParaRPr lang="nl-NL" sz="2000" dirty="0"/>
+          </a:p>
+          <a:p>
+            <a:endParaRPr lang="nl-NL" sz="2000" dirty="0" smtClean="0"/>
+          </a:p>
+          <a:p>
+            <a:endParaRPr lang="nl-NL" sz="2000" dirty="0"/>
+          </a:p>
+          <a:p>
+            <a:endParaRPr lang="nl-NL" sz="2000" dirty="0" smtClean="0"/>
+          </a:p>
+          <a:p>
+            <a:endParaRPr lang="nl-NL" sz="2000" dirty="0"/>
+          </a:p>
+          <a:p>
+            <a:endParaRPr lang="nl-NL" sz="2000" dirty="0"/>
+          </a:p>
+        </p:txBody>
+      </p:sp>
+      <p:pic>
+        <p:nvPicPr>
+          <p:cNvPr id="6" name="Afbeelding 5"/>
+          <p:cNvPicPr>
+            <a:picLocks noChangeAspect="1"/>
+          </p:cNvPicPr>
+          <p:nvPr/>
+        </p:nvPicPr>
+        <p:blipFill>
+          <a:blip r:embed="rId2">
+            <a:extLst>
+              <a:ext uri="{28A0092B-C50C-407E-A947-70E740481C1C}">
+                <a14:useLocalDpi xmlns:a14="http://schemas.microsoft.com/office/drawing/2010/main" val="0"/>
+              </a:ext>
+            </a:extLst>
+          </a:blip>
+          <a:stretch>
+            <a:fillRect/>
+          </a:stretch>
+        </p:blipFill>
+        <p:spPr>
+          <a:xfrm>
+            <a:off x="2320564" y="1883347"/>
+            <a:ext cx="6861897" cy="4801038"/>
+          </a:xfrm>
+          <a:prstGeom prst="rect">
+            <a:avLst/>
+          </a:prstGeom>
+        </p:spPr>
+      </p:pic>
+      <p:pic>
+        <p:nvPicPr>
+          <p:cNvPr id="7" name="Afbeelding 6"/>
+          <p:cNvPicPr>
+            <a:picLocks noChangeAspect="1"/>
+          </p:cNvPicPr>
+          <p:nvPr/>
+        </p:nvPicPr>
+        <p:blipFill>
+          <a:blip r:embed="rId3">
+            <a:extLst>
+              <a:ext uri="{28A0092B-C50C-407E-A947-70E740481C1C}">
+                <a14:useLocalDpi xmlns:a14="http://schemas.microsoft.com/office/drawing/2010/main" val="0"/>
+              </a:ext>
+            </a:extLst>
+          </a:blip>
+          <a:stretch>
+            <a:fillRect/>
+          </a:stretch>
+        </p:blipFill>
+        <p:spPr>
+          <a:xfrm>
+            <a:off x="685801" y="2065867"/>
+            <a:ext cx="10201275" cy="4238625"/>
+          </a:xfrm>
+          <a:prstGeom prst="rect">
+            <a:avLst/>
+          </a:prstGeom>
+        </p:spPr>
+      </p:pic>
+      <p:pic>
+        <p:nvPicPr>
+          <p:cNvPr id="8" name="Afbeelding 7"/>
+          <p:cNvPicPr>
+            <a:picLocks noChangeAspect="1"/>
+          </p:cNvPicPr>
+          <p:nvPr/>
+        </p:nvPicPr>
+        <p:blipFill>
+          <a:blip r:embed="rId4">
+            <a:extLst>
+              <a:ext uri="{28A0092B-C50C-407E-A947-70E740481C1C}">
+                <a14:useLocalDpi xmlns:a14="http://schemas.microsoft.com/office/drawing/2010/main" val="0"/>
+              </a:ext>
+            </a:extLst>
+          </a:blip>
+          <a:stretch>
+            <a:fillRect/>
+          </a:stretch>
+        </p:blipFill>
+        <p:spPr>
+          <a:xfrm>
+            <a:off x="708026" y="927821"/>
+            <a:ext cx="10144125" cy="5667375"/>
+          </a:xfrm>
+          <a:prstGeom prst="rect">
+            <a:avLst/>
+          </a:prstGeom>
+        </p:spPr>
+      </p:pic>
+      <p:pic>
+        <p:nvPicPr>
+          <p:cNvPr id="10" name="Afbeelding 9"/>
+          <p:cNvPicPr>
+            <a:picLocks noChangeAspect="1"/>
+          </p:cNvPicPr>
+          <p:nvPr/>
+        </p:nvPicPr>
+        <p:blipFill>
+          <a:blip r:embed="rId5">
+            <a:extLst>
+              <a:ext uri="{28A0092B-C50C-407E-A947-70E740481C1C}">
+                <a14:useLocalDpi xmlns:a14="http://schemas.microsoft.com/office/drawing/2010/main" val="0"/>
+              </a:ext>
+            </a:extLst>
+          </a:blip>
+          <a:stretch>
+            <a:fillRect/>
+          </a:stretch>
+        </p:blipFill>
+        <p:spPr>
+          <a:xfrm>
+            <a:off x="1284575" y="1518370"/>
+            <a:ext cx="8562975" cy="4486275"/>
+          </a:xfrm>
+          <a:prstGeom prst="rect">
+            <a:avLst/>
+          </a:prstGeom>
+        </p:spPr>
+      </p:pic>
+      <p:pic>
+        <p:nvPicPr>
+          <p:cNvPr id="11" name="Afbeelding 10"/>
+          <p:cNvPicPr>
+            <a:picLocks noChangeAspect="1"/>
+          </p:cNvPicPr>
+          <p:nvPr/>
+        </p:nvPicPr>
+        <p:blipFill>
+          <a:blip r:embed="rId6">
+            <a:extLst>
+              <a:ext uri="{28A0092B-C50C-407E-A947-70E740481C1C}">
+                <a14:useLocalDpi xmlns:a14="http://schemas.microsoft.com/office/drawing/2010/main" val="0"/>
+              </a:ext>
+            </a:extLst>
+          </a:blip>
+          <a:stretch>
+            <a:fillRect/>
+          </a:stretch>
+        </p:blipFill>
+        <p:spPr>
+          <a:xfrm>
+            <a:off x="293975" y="1518370"/>
+            <a:ext cx="11687175" cy="4467225"/>
+          </a:xfrm>
+          <a:prstGeom prst="rect">
+            <a:avLst/>
+          </a:prstGeom>
+        </p:spPr>
+      </p:pic>
+      <p:pic>
+        <p:nvPicPr>
+          <p:cNvPr id="12" name="Afbeelding 11"/>
+          <p:cNvPicPr>
+            <a:picLocks noChangeAspect="1"/>
+          </p:cNvPicPr>
+          <p:nvPr/>
+        </p:nvPicPr>
+        <p:blipFill>
+          <a:blip r:embed="rId7">
+            <a:extLst>
+              <a:ext uri="{28A0092B-C50C-407E-A947-70E740481C1C}">
+                <a14:useLocalDpi xmlns:a14="http://schemas.microsoft.com/office/drawing/2010/main" val="0"/>
+              </a:ext>
+            </a:extLst>
+          </a:blip>
+          <a:stretch>
+            <a:fillRect/>
+          </a:stretch>
+        </p:blipFill>
+        <p:spPr>
+          <a:xfrm>
+            <a:off x="873702" y="589492"/>
+            <a:ext cx="10153650" cy="5715000"/>
+          </a:xfrm>
+          <a:prstGeom prst="rect">
+            <a:avLst/>
+          </a:prstGeom>
+        </p:spPr>
+      </p:pic>
+      <p:pic>
+        <p:nvPicPr>
+          <p:cNvPr id="13" name="Afbeelding 12"/>
+          <p:cNvPicPr>
+            <a:picLocks noChangeAspect="1"/>
+          </p:cNvPicPr>
+          <p:nvPr/>
+        </p:nvPicPr>
+        <p:blipFill>
+          <a:blip r:embed="rId8">
+            <a:extLst>
+              <a:ext uri="{28A0092B-C50C-407E-A947-70E740481C1C}">
+                <a14:useLocalDpi xmlns:a14="http://schemas.microsoft.com/office/drawing/2010/main" val="0"/>
+              </a:ext>
+            </a:extLst>
+          </a:blip>
+          <a:stretch>
+            <a:fillRect/>
+          </a:stretch>
+        </p:blipFill>
+        <p:spPr>
+          <a:xfrm>
+            <a:off x="888640" y="1581150"/>
+            <a:ext cx="10182225" cy="4210050"/>
+          </a:xfrm>
+          <a:prstGeom prst="rect">
+            <a:avLst/>
+          </a:prstGeom>
+        </p:spPr>
+      </p:pic>
+    </p:spTree>
+    <p:extLst>
+      <p:ext uri="{BB962C8B-B14F-4D97-AF65-F5344CB8AC3E}">
+        <p14:creationId xmlns:p14="http://schemas.microsoft.com/office/powerpoint/2010/main" val="283113134"/>
+      </p:ext>
+    </p:extLst>
+  </p:cSld>
+  <p:clrMapOvr>
+    <a:masterClrMapping/>
+  </p:clrMapOvr>
+  <p:timing>
+    <p:tnLst>
+      <p:par>
+        <p:cTn id="1" dur="indefinite" restart="never" nodeType="tmRoot">
+          <p:childTnLst>
+            <p:seq concurrent="1" nextAc="seek">
+              <p:cTn id="2" dur="indefinite" nodeType="mainSeq">
+                <p:childTnLst>
+                  <p:par>
+                    <p:cTn id="3" fill="hold">
+                      <p:stCondLst>
+                        <p:cond delay="indefinite"/>
+                      </p:stCondLst>
+                      <p:childTnLst>
+                        <p:par>
+                          <p:cTn id="4" fill="hold">
+                            <p:stCondLst>
+                              <p:cond delay="0"/>
+                            </p:stCondLst>
+                            <p:childTnLst>
+                              <p:par>
+                                <p:cTn id="5" presetID="1" presetClass="entr" presetSubtype="0" fill="hold" nodeType="clickEffect">
+                                  <p:stCondLst>
+                                    <p:cond delay="0"/>
+                                  </p:stCondLst>
+                                  <p:childTnLst>
+                                    <p:set>
+                                      <p:cBhvr>
+                                        <p:cTn id="6" dur="1" fill="hold">
+                                          <p:stCondLst>
+                                            <p:cond delay="0"/>
+                                          </p:stCondLst>
+                                        </p:cTn>
+                                        <p:tgtEl>
+                                          <p:spTgt spid="7"/>
+                                        </p:tgtEl>
+                                        <p:attrNameLst>
+                                          <p:attrName>style.visibility</p:attrName>
+                                        </p:attrNameLst>
+                                      </p:cBhvr>
+                                      <p:to>
+                                        <p:strVal val="visible"/>
+                                      </p:to>
+                                    </p:set>
+                                  </p:childTnLst>
+                                </p:cTn>
+                              </p:par>
+                            </p:childTnLst>
+                          </p:cTn>
+                        </p:par>
+                      </p:childTnLst>
+                    </p:cTn>
+                  </p:par>
+                  <p:par>
+                    <p:cTn id="7" fill="hold">
+                      <p:stCondLst>
+                        <p:cond delay="indefinite"/>
+                      </p:stCondLst>
+                      <p:childTnLst>
+                        <p:par>
+                          <p:cTn id="8" fill="hold">
+                            <p:stCondLst>
+                              <p:cond delay="0"/>
+                            </p:stCondLst>
+                            <p:childTnLst>
+                              <p:par>
+                                <p:cTn id="9" presetID="1" presetClass="entr" presetSubtype="0" fill="hold" nodeType="clickEffect">
+                                  <p:stCondLst>
+                                    <p:cond delay="0"/>
+                                  </p:stCondLst>
+                                  <p:childTnLst>
+                                    <p:set>
+                                      <p:cBhvr>
+                                        <p:cTn id="10" dur="1" fill="hold">
+                                          <p:stCondLst>
+                                            <p:cond delay="0"/>
+                                          </p:stCondLst>
+                                        </p:cTn>
+                                        <p:tgtEl>
+                                          <p:spTgt spid="8"/>
+                                        </p:tgtEl>
+                                        <p:attrNameLst>
+                                          <p:attrName>style.visibility</p:attrName>
+                                        </p:attrNameLst>
+                                      </p:cBhvr>
+                                      <p:to>
+                                        <p:strVal val="visible"/>
+                                      </p:to>
+                                    </p:set>
+                                  </p:childTnLst>
+                                </p:cTn>
+                              </p:par>
+                            </p:childTnLst>
+                          </p:cTn>
+                        </p:par>
+                      </p:childTnLst>
+                    </p:cTn>
+                  </p:par>
+                  <p:par>
+                    <p:cTn id="11" fill="hold">
+                      <p:stCondLst>
+                        <p:cond delay="indefinite"/>
+                      </p:stCondLst>
+                      <p:childTnLst>
+                        <p:par>
+                          <p:cTn id="12" fill="hold">
+                            <p:stCondLst>
+                              <p:cond delay="0"/>
+                            </p:stCondLst>
+                            <p:childTnLst>
+                              <p:par>
+                                <p:cTn id="13" presetID="1" presetClass="entr" presetSubtype="0" fill="hold" nodeType="clickEffect">
+                                  <p:stCondLst>
+                                    <p:cond delay="0"/>
+                                  </p:stCondLst>
+                                  <p:childTnLst>
+                                    <p:set>
+                                      <p:cBhvr>
+                                        <p:cTn id="14" dur="1" fill="hold">
+                                          <p:stCondLst>
+                                            <p:cond delay="0"/>
+                                          </p:stCondLst>
+                                        </p:cTn>
+                                        <p:tgtEl>
+                                          <p:spTgt spid="10"/>
+                                        </p:tgtEl>
+                                        <p:attrNameLst>
+                                          <p:attrName>style.visibility</p:attrName>
+                                        </p:attrNameLst>
+                                      </p:cBhvr>
+                                      <p:to>
+                                        <p:strVal val="visible"/>
+                                      </p:to>
+                                    </p:set>
+                                  </p:childTnLst>
+                                </p:cTn>
+                              </p:par>
+                            </p:childTnLst>
+                          </p:cTn>
+                        </p:par>
+                      </p:childTnLst>
+                    </p:cTn>
+                  </p:par>
+                  <p:par>
+                    <p:cTn id="15" fill="hold">
+                      <p:stCondLst>
+                        <p:cond delay="indefinite"/>
+                      </p:stCondLst>
+                      <p:childTnLst>
+                        <p:par>
+                          <p:cTn id="16" fill="hold">
+                            <p:stCondLst>
+                              <p:cond delay="0"/>
+                            </p:stCondLst>
+                            <p:childTnLst>
+                              <p:par>
+                                <p:cTn id="17" presetID="1" presetClass="entr" presetSubtype="0" fill="hold" nodeType="clickEffect">
+                                  <p:stCondLst>
+                                    <p:cond delay="0"/>
+                                  </p:stCondLst>
+                                  <p:childTnLst>
+                                    <p:set>
+                                      <p:cBhvr>
+                                        <p:cTn id="18" dur="1" fill="hold">
+                                          <p:stCondLst>
+                                            <p:cond delay="0"/>
+                                          </p:stCondLst>
+                                        </p:cTn>
+                                        <p:tgtEl>
+                                          <p:spTgt spid="11"/>
+                                        </p:tgtEl>
+                                        <p:attrNameLst>
+                                          <p:attrName>style.visibility</p:attrName>
+                                        </p:attrNameLst>
+                                      </p:cBhvr>
+                                      <p:to>
+                                        <p:strVal val="visible"/>
+                                      </p:to>
+                                    </p:set>
+                                  </p:childTnLst>
+                                </p:cTn>
+                              </p:par>
+                            </p:childTnLst>
+                          </p:cTn>
+                        </p:par>
+                      </p:childTnLst>
+                    </p:cTn>
+                  </p:par>
+                  <p:par>
+                    <p:cTn id="19" fill="hold">
+                      <p:stCondLst>
+                        <p:cond delay="indefinite"/>
+                      </p:stCondLst>
+                      <p:childTnLst>
+                        <p:par>
+                          <p:cTn id="20" fill="hold">
+                            <p:stCondLst>
+                              <p:cond delay="0"/>
+                            </p:stCondLst>
+                            <p:childTnLst>
+                              <p:par>
+                                <p:cTn id="21" presetID="1" presetClass="entr" presetSubtype="0" fill="hold" nodeType="clickEffect">
+                                  <p:stCondLst>
+                                    <p:cond delay="0"/>
+                                  </p:stCondLst>
+                                  <p:childTnLst>
+                                    <p:set>
+                                      <p:cBhvr>
+                                        <p:cTn id="22" dur="1" fill="hold">
+                                          <p:stCondLst>
+                                            <p:cond delay="0"/>
+                                          </p:stCondLst>
+                                        </p:cTn>
+                                        <p:tgtEl>
+                                          <p:spTgt spid="12"/>
+                                        </p:tgtEl>
+                                        <p:attrNameLst>
+                                          <p:attrName>style.visibility</p:attrName>
+                                        </p:attrNameLst>
+                                      </p:cBhvr>
+                                      <p:to>
+                                        <p:strVal val="visible"/>
+                                      </p:to>
+                                    </p:set>
+                                  </p:childTnLst>
+                                </p:cTn>
+                              </p:par>
+                            </p:childTnLst>
+                          </p:cTn>
+                        </p:par>
+                      </p:childTnLst>
+                    </p:cTn>
+                  </p:par>
+                  <p:par>
+                    <p:cTn id="23" fill="hold">
+                      <p:stCondLst>
+                        <p:cond delay="indefinite"/>
+                      </p:stCondLst>
+                      <p:childTnLst>
+                        <p:par>
+                          <p:cTn id="24" fill="hold">
+                            <p:stCondLst>
+                              <p:cond delay="0"/>
+                            </p:stCondLst>
+                            <p:childTnLst>
+                              <p:par>
+                                <p:cTn id="25" presetID="1" presetClass="entr" presetSubtype="0" fill="hold" nodeType="clickEffect">
+                                  <p:stCondLst>
+                                    <p:cond delay="0"/>
+                                  </p:stCondLst>
+                                  <p:childTnLst>
+                                    <p:set>
+                                      <p:cBhvr>
+                                        <p:cTn id="26" dur="1" fill="hold">
+                                          <p:stCondLst>
+                                            <p:cond delay="0"/>
+                                          </p:stCondLst>
+                                        </p:cTn>
+                                        <p:tgtEl>
+                                          <p:spTgt spid="13"/>
+                                        </p:tgtEl>
+                                        <p:attrNameLst>
+                                          <p:attrName>style.visibility</p:attrName>
+                                        </p:attrNameLst>
+                                      </p:cBhvr>
+                                      <p:to>
+                                        <p:strVal val="visible"/>
+                                      </p:to>
+                                    </p:set>
+                                  </p:childTnLst>
+                                </p:cTn>
+                              </p:par>
+                            </p:childTnLst>
+                          </p:cTn>
+                        </p:par>
+                      </p:childTnLst>
+                    </p:cTn>
+                  </p:par>
+                </p:childTnLst>
+              </p:cTn>
+              <p:prevCondLst>
+                <p:cond evt="onPrev" delay="0">
+                  <p:tgtEl>
+                    <p:sldTgt/>
+                  </p:tgtEl>
+                </p:cond>
+              </p:prevCondLst>
+              <p:nextCondLst>
+                <p:cond evt="onNext" delay="0">
+                  <p:tgtEl>
+                    <p:sldTgt/>
+                  </p:tgtEl>
+                </p:cond>
+              </p:nextCondLst>
+            </p:seq>
+          </p:childTnLst>
+        </p:cTn>
+      </p:par>
+    </p:tnLst>
+  </p:timing>
+</p:sld>
+</file>
+
+<file path=ppt/slides/slide16.xml><?xml version="1.0" encoding="utf-8"?>
+<p:sld xmlns:a="http://schemas.openxmlformats.org/drawingml/2006/main" xmlns:r="http://schemas.openxmlformats.org/officeDocument/2006/relationships" xmlns:p="http://schemas.openxmlformats.org/presentationml/2006/main">
+  <p:cSld>
+    <p:spTree>
+      <p:nvGrpSpPr>
+        <p:cNvPr id="1" name=""/>
+        <p:cNvGrpSpPr/>
+        <p:nvPr/>
+      </p:nvGrpSpPr>
+      <p:grpSpPr>
+        <a:xfrm>
+          <a:off x="0" y="0"/>
+          <a:ext cx="0" cy="0"/>
+          <a:chOff x="0" y="0"/>
+          <a:chExt cx="0" cy="0"/>
+        </a:xfrm>
+      </p:grpSpPr>
+      <p:sp>
+        <p:nvSpPr>
+          <p:cNvPr id="2" name="Titel 1"/>
+          <p:cNvSpPr>
+            <a:spLocks noGrp="1"/>
+          </p:cNvSpPr>
+          <p:nvPr>
+            <p:ph type="title"/>
+          </p:nvPr>
+        </p:nvSpPr>
+        <p:spPr/>
+        <p:txBody>
+          <a:bodyPr/>
+          <a:lstStyle/>
+          <a:p>
+            <a:pPr algn="ctr"/>
+            <a:r>
+              <a:rPr lang="nl-NL" sz="6600" dirty="0" smtClean="0"/>
+              <a:t>Doel </a:t>
+            </a:r>
+            <a:endParaRPr lang="nl-NL" sz="6600" dirty="0"/>
+          </a:p>
+        </p:txBody>
+      </p:sp>
+      <p:sp>
+        <p:nvSpPr>
+          <p:cNvPr id="3" name="Tijdelijke aanduiding voor inhoud 2"/>
+          <p:cNvSpPr>
+            <a:spLocks noGrp="1"/>
+          </p:cNvSpPr>
+          <p:nvPr>
+            <p:ph idx="1"/>
+          </p:nvPr>
+        </p:nvSpPr>
+        <p:spPr/>
+        <p:txBody>
+          <a:bodyPr>
+            <a:normAutofit/>
+          </a:bodyPr>
+          <a:lstStyle/>
+          <a:p>
+            <a:r>
+              <a:rPr lang="nl-NL" sz="2000" dirty="0" smtClean="0"/>
+              <a:t>Einddoel</a:t>
+            </a:r>
+            <a:endParaRPr lang="nl-NL" sz="2000" dirty="0" smtClean="0"/>
+          </a:p>
+          <a:p>
+            <a:r>
+              <a:rPr lang="nl-NL" sz="2000" dirty="0" smtClean="0"/>
+              <a:t>Prototype</a:t>
+            </a:r>
+          </a:p>
+          <a:p>
+            <a:r>
+              <a:rPr lang="en-US" sz="2000" dirty="0" err="1" smtClean="0"/>
+              <a:t>Vragen</a:t>
+            </a:r>
+            <a:r>
+              <a:rPr lang="en-US" sz="2000" dirty="0" smtClean="0"/>
+              <a:t>?</a:t>
+            </a:r>
             <a:endParaRPr lang="nl-NL" sz="2000" dirty="0"/>
           </a:p>
           <a:p>
@@ -6304,6 +7312,13 @@
   <p:clrMapOvr>
     <a:masterClrMapping/>
   </p:clrMapOvr>
+  <p:timing>
+    <p:tnLst>
+      <p:par>
+        <p:cTn id="1" dur="indefinite" restart="never" nodeType="tmRoot"/>
+      </p:par>
+    </p:tnLst>
+  </p:timing>
 </p:sld>
 </file>
 
@@ -6433,6 +7448,13 @@
   <p:clrMapOvr>
     <a:masterClrMapping/>
   </p:clrMapOvr>
+  <p:timing>
+    <p:tnLst>
+      <p:par>
+        <p:cTn id="1" dur="indefinite" restart="never" nodeType="tmRoot"/>
+      </p:par>
+    </p:tnLst>
+  </p:timing>
 </p:sld>
 </file>
 
@@ -6551,6 +7573,13 @@
   <p:clrMapOvr>
     <a:masterClrMapping/>
   </p:clrMapOvr>
+  <p:timing>
+    <p:tnLst>
+      <p:par>
+        <p:cTn id="1" dur="indefinite" restart="never" nodeType="tmRoot"/>
+      </p:par>
+    </p:tnLst>
+  </p:timing>
 </p:sld>
 </file>
 
@@ -6589,11 +7618,7 @@
             <a:pPr algn="ctr"/>
             <a:r>
               <a:rPr lang="nl-NL" sz="6600" dirty="0" smtClean="0"/>
-              <a:t>GGD </a:t>
-            </a:r>
-            <a:r>
-              <a:rPr lang="nl-NL" sz="6600" dirty="0" smtClean="0"/>
-              <a:t>overzicht</a:t>
+              <a:t>GGD overzicht</a:t>
             </a:r>
             <a:endParaRPr lang="nl-NL" sz="6600" dirty="0"/>
           </a:p>
@@ -6645,14 +7670,13 @@
           <a:p>
             <a:r>
               <a:rPr lang="nl-NL" sz="2000" dirty="0" smtClean="0"/>
-              <a:t>Unique Aspect Game</a:t>
-            </a:r>
-          </a:p>
-          <a:p>
+              <a:t>Unique Aspect </a:t>
+            </a:r>
             <a:r>
               <a:rPr lang="nl-NL" sz="2000" dirty="0" smtClean="0"/>
-              <a:t>Puzzle Uitleg</a:t>
-            </a:r>
+              <a:t>Game</a:t>
+            </a:r>
+            <a:endParaRPr lang="nl-NL" sz="2000" dirty="0" smtClean="0"/>
           </a:p>
           <a:p>
             <a:r>
@@ -6686,6 +7710,13 @@
   <p:clrMapOvr>
     <a:masterClrMapping/>
   </p:clrMapOvr>
+  <p:timing>
+    <p:tnLst>
+      <p:par>
+        <p:cTn id="1" dur="indefinite" restart="never" nodeType="tmRoot"/>
+      </p:par>
+    </p:tnLst>
+  </p:timing>
 </p:sld>
 </file>
 
@@ -6747,40 +7778,30 @@
           </a:bodyPr>
           <a:lstStyle/>
           <a:p>
-            <a:r>
-              <a:rPr lang="nl-NL" sz="2000" dirty="0" smtClean="0"/>
-              <a:t>Introstory</a:t>
-            </a:r>
-          </a:p>
-          <a:p>
-            <a:r>
-              <a:rPr lang="nl-NL" sz="2000" dirty="0" smtClean="0"/>
-              <a:t>Uitleg Gekozen </a:t>
-            </a:r>
-            <a:r>
-              <a:rPr lang="nl-NL" sz="2000" dirty="0" err="1" smtClean="0"/>
-              <a:t>Zone’s</a:t>
-            </a:r>
-            <a:endParaRPr lang="nl-NL" sz="2000" dirty="0" smtClean="0"/>
-          </a:p>
-          <a:p>
+            <a:pPr marL="0" indent="0">
+              <a:buNone/>
+            </a:pPr>
             <a:r>
               <a:rPr lang="nl-NL" sz="2000" dirty="0"/>
-              <a:t>Unique Aspect </a:t>
-            </a:r>
-            <a:r>
-              <a:rPr lang="nl-NL" sz="2000" dirty="0" smtClean="0"/>
-              <a:t>Game</a:t>
-            </a:r>
-          </a:p>
-          <a:p>
-            <a:endParaRPr lang="nl-NL" sz="2000" dirty="0"/>
-          </a:p>
-          <a:p>
-            <a:endParaRPr lang="nl-NL" sz="2000" dirty="0" smtClean="0"/>
-          </a:p>
-          <a:p>
-            <a:endParaRPr lang="nl-NL" sz="2000" dirty="0"/>
+              <a:t>De Speler zit in een koloniaal cruiser, die gecontroleerd wordt door een high-level AI. De AI wordt corrupt na een fout gelopen </a:t>
+            </a:r>
+            <a:r>
+              <a:rPr lang="nl-NL" sz="2000" dirty="0" err="1"/>
+              <a:t>warp</a:t>
+            </a:r>
+            <a:r>
+              <a:rPr lang="nl-NL" sz="2000" dirty="0"/>
+              <a:t> en begint alle lagere AI van het schip over te nemen. Met haar nieuwe leger beginnen ze de bemanning en het clientèle af te slachten. De speler wordt uit zijn cryo sleep ontwaakt door een overlevende.</a:t>
+            </a:r>
+          </a:p>
+          <a:p>
+            <a:pPr marL="0" indent="0">
+              <a:buNone/>
+            </a:pPr>
+            <a:r>
+              <a:rPr lang="nl-NL" sz="2000" dirty="0"/>
+              <a:t>De alien livestock op het schip zijn losgebroken en zijn geëvolueerd door het zelfde fenomeen. De dieren vallen van alles aan op het schip. De livestock leven in een geïsoleerd gebied op het schip en de speler moet zich door dit gevaarlijke sectie wanen om bij het CPU te komen. </a:t>
+            </a:r>
           </a:p>
           <a:p>
             <a:endParaRPr lang="nl-NL" sz="2000" dirty="0"/>
@@ -6800,6 +7821,13 @@
   <p:clrMapOvr>
     <a:masterClrMapping/>
   </p:clrMapOvr>
+  <p:timing>
+    <p:tnLst>
+      <p:par>
+        <p:cTn id="1" dur="indefinite" restart="never" nodeType="tmRoot"/>
+      </p:par>
+    </p:tnLst>
+  </p:timing>
 </p:sld>
 </file>
 
@@ -6837,16 +7865,12 @@
           <a:p>
             <a:pPr algn="ctr"/>
             <a:r>
-              <a:rPr lang="nl-NL" sz="6600" dirty="0" smtClean="0"/>
-              <a:t>Game </a:t>
-            </a:r>
-            <a:r>
-              <a:rPr lang="nl-NL" sz="6600" dirty="0" err="1" smtClean="0"/>
-              <a:t>Mechanics</a:t>
-            </a:r>
-            <a:r>
-              <a:rPr lang="nl-NL" sz="6600" dirty="0" smtClean="0"/>
-              <a:t> </a:t>
+              <a:rPr lang="en-US" sz="6600" dirty="0" err="1" smtClean="0"/>
+              <a:t>Uitleg</a:t>
+            </a:r>
+            <a:r>
+              <a:rPr lang="en-US" sz="6600" dirty="0" smtClean="0"/>
+              <a:t> Zones</a:t>
             </a:r>
             <a:endParaRPr lang="nl-NL" sz="6600" dirty="0"/>
           </a:p>
@@ -6862,63 +7886,145 @@
             <p:ph idx="1"/>
           </p:nvPr>
         </p:nvSpPr>
-        <p:spPr/>
+        <p:spPr>
+          <a:xfrm>
+            <a:off x="685801" y="2142067"/>
+            <a:ext cx="10131425" cy="4622415"/>
+          </a:xfrm>
+        </p:spPr>
         <p:txBody>
           <a:bodyPr>
             <a:normAutofit/>
           </a:bodyPr>
           <a:lstStyle/>
           <a:p>
-            <a:r>
-              <a:rPr lang="nl-NL" sz="2000" dirty="0" err="1"/>
-              <a:t>Mechanics</a:t>
-            </a:r>
-            <a:r>
-              <a:rPr lang="nl-NL" sz="2000" dirty="0"/>
-              <a:t> Game</a:t>
-            </a:r>
-          </a:p>
-          <a:p>
-            <a:r>
-              <a:rPr lang="nl-NL" sz="2000" dirty="0"/>
-              <a:t>Uitleg </a:t>
-            </a:r>
-            <a:r>
-              <a:rPr lang="nl-NL" sz="2000" dirty="0" err="1" smtClean="0"/>
-              <a:t>Enemies</a:t>
-            </a:r>
+            <a:pPr marL="0" indent="0">
+              <a:buNone/>
+            </a:pPr>
+            <a:endParaRPr lang="nl-NL" dirty="0"/>
+          </a:p>
+          <a:p>
+            <a:pPr marL="0" indent="0">
+              <a:buNone/>
+            </a:pPr>
+            <a:endParaRPr lang="en-US" sz="2000" dirty="0" smtClean="0"/>
+          </a:p>
+          <a:p>
+            <a:pPr marL="0" indent="0">
+              <a:buNone/>
+            </a:pPr>
             <a:endParaRPr lang="nl-NL" sz="2000" dirty="0" smtClean="0"/>
           </a:p>
           <a:p>
+            <a:endParaRPr lang="en-US" sz="2000" dirty="0"/>
+          </a:p>
+          <a:p>
+            <a:endParaRPr lang="en-US" sz="2000" dirty="0" smtClean="0"/>
+          </a:p>
+          <a:p>
             <a:endParaRPr lang="nl-NL" sz="2000" dirty="0"/>
           </a:p>
           <a:p>
+            <a:r>
+              <a:rPr lang="en-US" sz="2000" dirty="0" err="1" smtClean="0"/>
+              <a:t>Verdieping</a:t>
+            </a:r>
+            <a:r>
+              <a:rPr lang="en-US" sz="2000" dirty="0" smtClean="0"/>
+              <a:t> 3														</a:t>
+            </a:r>
+            <a:r>
+              <a:rPr lang="en-US" sz="2000" dirty="0" err="1" smtClean="0"/>
+              <a:t>Verdieping</a:t>
+            </a:r>
+            <a:r>
+              <a:rPr lang="en-US" sz="2000" dirty="0" smtClean="0"/>
+              <a:t> 2</a:t>
+            </a:r>
+            <a:endParaRPr lang="nl-NL" sz="2000" dirty="0"/>
+          </a:p>
+          <a:p>
             <a:endParaRPr lang="nl-NL" sz="2000" dirty="0" smtClean="0"/>
           </a:p>
-          <a:p>
-            <a:endParaRPr lang="nl-NL" sz="2000" dirty="0"/>
-          </a:p>
-          <a:p>
-            <a:endParaRPr lang="nl-NL" sz="2000" dirty="0" smtClean="0"/>
-          </a:p>
-          <a:p>
-            <a:endParaRPr lang="nl-NL" sz="2000" dirty="0"/>
-          </a:p>
-          <a:p>
-            <a:endParaRPr lang="nl-NL" sz="2000" dirty="0"/>
-          </a:p>
-        </p:txBody>
-      </p:sp>
+        </p:txBody>
+      </p:sp>
+      <p:pic>
+        <p:nvPicPr>
+          <p:cNvPr id="5" name="Afbeelding 4"/>
+          <p:cNvPicPr>
+            <a:picLocks noChangeAspect="1"/>
+          </p:cNvPicPr>
+          <p:nvPr/>
+        </p:nvPicPr>
+        <p:blipFill>
+          <a:blip r:embed="rId2" cstate="print">
+            <a:extLst>
+              <a:ext uri="{28A0092B-C50C-407E-A947-70E740481C1C}">
+                <a14:useLocalDpi xmlns:a14="http://schemas.microsoft.com/office/drawing/2010/main" val="0"/>
+              </a:ext>
+            </a:extLst>
+          </a:blip>
+          <a:stretch>
+            <a:fillRect/>
+          </a:stretch>
+        </p:blipFill>
+        <p:spPr>
+          <a:xfrm>
+            <a:off x="265114" y="2386902"/>
+            <a:ext cx="5486399" cy="3086099"/>
+          </a:xfrm>
+          <a:prstGeom prst="rect">
+            <a:avLst/>
+          </a:prstGeom>
+        </p:spPr>
+      </p:pic>
+      <p:pic>
+        <p:nvPicPr>
+          <p:cNvPr id="6" name="Afbeelding 5"/>
+          <p:cNvPicPr>
+            <a:picLocks noChangeAspect="1"/>
+          </p:cNvPicPr>
+          <p:nvPr/>
+        </p:nvPicPr>
+        <p:blipFill>
+          <a:blip r:embed="rId3" cstate="print">
+            <a:extLst>
+              <a:ext uri="{28A0092B-C50C-407E-A947-70E740481C1C}">
+                <a14:useLocalDpi xmlns:a14="http://schemas.microsoft.com/office/drawing/2010/main" val="0"/>
+              </a:ext>
+            </a:extLst>
+          </a:blip>
+          <a:stretch>
+            <a:fillRect/>
+          </a:stretch>
+        </p:blipFill>
+        <p:spPr>
+          <a:xfrm>
+            <a:off x="5808519" y="2142067"/>
+            <a:ext cx="6061363" cy="3409516"/>
+          </a:xfrm>
+          <a:prstGeom prst="rect">
+            <a:avLst/>
+          </a:prstGeom>
+        </p:spPr>
+      </p:pic>
     </p:spTree>
     <p:extLst>
       <p:ext uri="{BB962C8B-B14F-4D97-AF65-F5344CB8AC3E}">
-        <p14:creationId xmlns:p14="http://schemas.microsoft.com/office/powerpoint/2010/main" val="872027322"/>
+        <p14:creationId xmlns:p14="http://schemas.microsoft.com/office/powerpoint/2010/main" val="4059469929"/>
       </p:ext>
     </p:extLst>
   </p:cSld>
   <p:clrMapOvr>
     <a:masterClrMapping/>
   </p:clrMapOvr>
+  <p:timing>
+    <p:tnLst>
+      <p:par>
+        <p:cTn id="1" dur="indefinite" restart="never" nodeType="tmRoot"/>
+      </p:par>
+    </p:tnLst>
+  </p:timing>
 </p:sld>
 </file>
 
@@ -6956,8 +8062,12 @@
           <a:p>
             <a:pPr algn="ctr"/>
             <a:r>
-              <a:rPr lang="nl-NL" sz="6600" dirty="0" smtClean="0"/>
-              <a:t>Creativiteit</a:t>
+              <a:rPr lang="en-US" sz="6600" dirty="0" err="1" smtClean="0"/>
+              <a:t>Uitleg</a:t>
+            </a:r>
+            <a:r>
+              <a:rPr lang="en-US" sz="6600" dirty="0" smtClean="0"/>
+              <a:t> Zones</a:t>
             </a:r>
             <a:endParaRPr lang="nl-NL" sz="6600" dirty="0"/>
           </a:p>
@@ -6973,58 +8083,145 @@
             <p:ph idx="1"/>
           </p:nvPr>
         </p:nvSpPr>
-        <p:spPr/>
+        <p:spPr>
+          <a:xfrm>
+            <a:off x="685801" y="2142067"/>
+            <a:ext cx="10131425" cy="4622415"/>
+          </a:xfrm>
+        </p:spPr>
         <p:txBody>
           <a:bodyPr>
             <a:normAutofit/>
           </a:bodyPr>
           <a:lstStyle/>
           <a:p>
-            <a:r>
-              <a:rPr lang="nl-NL" sz="2000" dirty="0"/>
-              <a:t>Creativiteit En Vindingrijkheid</a:t>
-            </a:r>
-          </a:p>
-          <a:p>
-            <a:r>
-              <a:rPr lang="nl-NL" sz="2000" dirty="0"/>
-              <a:t>Puzzle </a:t>
-            </a:r>
-            <a:r>
-              <a:rPr lang="nl-NL" sz="2000" dirty="0" smtClean="0"/>
-              <a:t>Uitleg</a:t>
-            </a:r>
+            <a:pPr marL="0" indent="0">
+              <a:buNone/>
+            </a:pPr>
+            <a:endParaRPr lang="nl-NL" dirty="0"/>
+          </a:p>
+          <a:p>
+            <a:pPr marL="0" indent="0">
+              <a:buNone/>
+            </a:pPr>
+            <a:endParaRPr lang="en-US" sz="2000" dirty="0" smtClean="0"/>
+          </a:p>
+          <a:p>
+            <a:pPr marL="0" indent="0">
+              <a:buNone/>
+            </a:pPr>
+            <a:endParaRPr lang="nl-NL" sz="2000" dirty="0" smtClean="0"/>
+          </a:p>
+          <a:p>
+            <a:endParaRPr lang="en-US" sz="2000" dirty="0"/>
+          </a:p>
+          <a:p>
+            <a:endParaRPr lang="en-US" sz="2000" dirty="0" smtClean="0"/>
           </a:p>
           <a:p>
             <a:endParaRPr lang="nl-NL" sz="2000" dirty="0"/>
           </a:p>
           <a:p>
+            <a:r>
+              <a:rPr lang="en-US" sz="2000" dirty="0" err="1" smtClean="0"/>
+              <a:t>Verdieping</a:t>
+            </a:r>
+            <a:r>
+              <a:rPr lang="en-US" sz="2000" dirty="0" smtClean="0"/>
+              <a:t> 1														</a:t>
+            </a:r>
+            <a:r>
+              <a:rPr lang="en-US" sz="2000" dirty="0" err="1" smtClean="0"/>
+              <a:t>Verdieping</a:t>
+            </a:r>
+            <a:r>
+              <a:rPr lang="en-US" sz="2000" dirty="0" smtClean="0"/>
+              <a:t> 0</a:t>
+            </a:r>
+            <a:endParaRPr lang="nl-NL" sz="2000" dirty="0"/>
+          </a:p>
+          <a:p>
             <a:endParaRPr lang="nl-NL" sz="2000" dirty="0" smtClean="0"/>
           </a:p>
-          <a:p>
-            <a:endParaRPr lang="nl-NL" sz="2000" dirty="0"/>
-          </a:p>
-          <a:p>
-            <a:endParaRPr lang="nl-NL" sz="2000" dirty="0" smtClean="0"/>
-          </a:p>
-          <a:p>
-            <a:endParaRPr lang="nl-NL" sz="2000" dirty="0"/>
-          </a:p>
-          <a:p>
-            <a:endParaRPr lang="nl-NL" sz="2000" dirty="0"/>
-          </a:p>
-        </p:txBody>
-      </p:sp>
+        </p:txBody>
+      </p:sp>
+      <p:pic>
+        <p:nvPicPr>
+          <p:cNvPr id="5" name="Afbeelding 4"/>
+          <p:cNvPicPr>
+            <a:picLocks noChangeAspect="1"/>
+          </p:cNvPicPr>
+          <p:nvPr/>
+        </p:nvPicPr>
+        <p:blipFill>
+          <a:blip r:embed="rId2" cstate="print">
+            <a:extLst>
+              <a:ext uri="{28A0092B-C50C-407E-A947-70E740481C1C}">
+                <a14:useLocalDpi xmlns:a14="http://schemas.microsoft.com/office/drawing/2010/main" val="0"/>
+              </a:ext>
+            </a:extLst>
+          </a:blip>
+          <a:stretch>
+            <a:fillRect/>
+          </a:stretch>
+        </p:blipFill>
+        <p:spPr>
+          <a:xfrm>
+            <a:off x="265114" y="2386902"/>
+            <a:ext cx="5486399" cy="3086099"/>
+          </a:xfrm>
+          <a:prstGeom prst="rect">
+            <a:avLst/>
+          </a:prstGeom>
+        </p:spPr>
+      </p:pic>
+      <p:pic>
+        <p:nvPicPr>
+          <p:cNvPr id="6" name="Afbeelding 5"/>
+          <p:cNvPicPr>
+            <a:picLocks noChangeAspect="1"/>
+          </p:cNvPicPr>
+          <p:nvPr/>
+        </p:nvPicPr>
+        <p:blipFill>
+          <a:blip r:embed="rId3" cstate="print">
+            <a:extLst>
+              <a:ext uri="{28A0092B-C50C-407E-A947-70E740481C1C}">
+                <a14:useLocalDpi xmlns:a14="http://schemas.microsoft.com/office/drawing/2010/main" val="0"/>
+              </a:ext>
+            </a:extLst>
+          </a:blip>
+          <a:stretch>
+            <a:fillRect/>
+          </a:stretch>
+        </p:blipFill>
+        <p:spPr>
+          <a:xfrm>
+            <a:off x="5808519" y="2142067"/>
+            <a:ext cx="6061363" cy="3409516"/>
+          </a:xfrm>
+          <a:prstGeom prst="rect">
+            <a:avLst/>
+          </a:prstGeom>
+        </p:spPr>
+      </p:pic>
     </p:spTree>
     <p:extLst>
       <p:ext uri="{BB962C8B-B14F-4D97-AF65-F5344CB8AC3E}">
-        <p14:creationId xmlns:p14="http://schemas.microsoft.com/office/powerpoint/2010/main" val="3735039959"/>
+        <p14:creationId xmlns:p14="http://schemas.microsoft.com/office/powerpoint/2010/main" val="2238139734"/>
       </p:ext>
     </p:extLst>
   </p:cSld>
   <p:clrMapOvr>
     <a:masterClrMapping/>
   </p:clrMapOvr>
+  <p:timing>
+    <p:tnLst>
+      <p:par>
+        <p:cTn id="1" dur="indefinite" restart="never" nodeType="tmRoot"/>
+      </p:par>
+    </p:tnLst>
+  </p:timing>
 </p:sld>
 </file>
 
@@ -7063,7 +8260,15 @@
             <a:pPr algn="ctr"/>
             <a:r>
               <a:rPr lang="nl-NL" sz="6600" dirty="0" smtClean="0"/>
-              <a:t>Art Style</a:t>
+              <a:t>Game </a:t>
+            </a:r>
+            <a:r>
+              <a:rPr lang="nl-NL" sz="6600" dirty="0" err="1" smtClean="0"/>
+              <a:t>Mechanics</a:t>
+            </a:r>
+            <a:r>
+              <a:rPr lang="nl-NL" sz="6600" dirty="0" smtClean="0"/>
+              <a:t> </a:t>
             </a:r>
             <a:endParaRPr lang="nl-NL" sz="6600" dirty="0"/>
           </a:p>
@@ -7087,29 +8292,92 @@
           <a:lstStyle/>
           <a:p>
             <a:r>
+              <a:rPr lang="nl-NL" sz="2000" dirty="0"/>
+              <a:t>Mechanics </a:t>
+            </a:r>
+            <a:r>
               <a:rPr lang="nl-NL" sz="2000" dirty="0" smtClean="0"/>
-              <a:t>Concept Art</a:t>
-            </a:r>
-          </a:p>
-          <a:p>
-            <a:r>
-              <a:rPr lang="nl-NL" sz="2000" dirty="0" smtClean="0"/>
-              <a:t>Onderbouwing Keuzen</a:t>
-            </a:r>
-          </a:p>
-          <a:p>
-            <a:endParaRPr lang="nl-NL" sz="2000" dirty="0"/>
-          </a:p>
-          <a:p>
-            <a:endParaRPr lang="nl-NL" sz="2000" dirty="0" smtClean="0"/>
-          </a:p>
-          <a:p>
-            <a:endParaRPr lang="nl-NL" sz="2000" dirty="0"/>
-          </a:p>
-          <a:p>
-            <a:endParaRPr lang="nl-NL" sz="2000" dirty="0" smtClean="0"/>
-          </a:p>
-          <a:p>
+              <a:t>Game</a:t>
+            </a:r>
+          </a:p>
+          <a:p>
+            <a:pPr lvl="1"/>
+            <a:r>
+              <a:rPr lang="en-US" dirty="0" smtClean="0"/>
+              <a:t>Player mechanic</a:t>
+            </a:r>
+            <a:endParaRPr lang="en-US" dirty="0"/>
+          </a:p>
+          <a:p>
+            <a:pPr lvl="1"/>
+            <a:r>
+              <a:rPr lang="en-US" dirty="0" smtClean="0"/>
+              <a:t>Weapon Mechanic</a:t>
+            </a:r>
+          </a:p>
+          <a:p>
+            <a:pPr lvl="1"/>
+            <a:r>
+              <a:rPr lang="en-US" dirty="0" smtClean="0"/>
+              <a:t>Med- </a:t>
+            </a:r>
+            <a:r>
+              <a:rPr lang="en-US" dirty="0" err="1" smtClean="0"/>
+              <a:t>en</a:t>
+            </a:r>
+            <a:r>
+              <a:rPr lang="en-US" dirty="0" smtClean="0"/>
+              <a:t> </a:t>
+            </a:r>
+            <a:r>
+              <a:rPr lang="en-US" dirty="0" err="1" smtClean="0"/>
+              <a:t>StimPacks</a:t>
+            </a:r>
+            <a:r>
+              <a:rPr lang="en-US" dirty="0" smtClean="0"/>
+              <a:t> mechanic (</a:t>
+            </a:r>
+            <a:r>
+              <a:rPr lang="en-US" dirty="0" err="1" smtClean="0"/>
+              <a:t>uniek</a:t>
+            </a:r>
+            <a:r>
+              <a:rPr lang="en-US" dirty="0" smtClean="0"/>
+              <a:t> aspect)</a:t>
+            </a:r>
+          </a:p>
+          <a:p>
+            <a:pPr lvl="1"/>
+            <a:r>
+              <a:rPr lang="en-US" dirty="0" smtClean="0"/>
+              <a:t>Loot mechanic</a:t>
+            </a:r>
+          </a:p>
+          <a:p>
+            <a:pPr lvl="1"/>
+            <a:r>
+              <a:rPr lang="en-US" dirty="0" smtClean="0"/>
+              <a:t>Alarm mechanic (</a:t>
+            </a:r>
+            <a:r>
+              <a:rPr lang="en-US" dirty="0" err="1" smtClean="0"/>
+              <a:t>uniek</a:t>
+            </a:r>
+            <a:r>
+              <a:rPr lang="en-US" dirty="0" smtClean="0"/>
+              <a:t> aspect)</a:t>
+            </a:r>
+          </a:p>
+          <a:p>
+            <a:pPr lvl="1"/>
+            <a:r>
+              <a:rPr lang="en-US" dirty="0" smtClean="0"/>
+              <a:t>Enemy mechanic</a:t>
+            </a:r>
+            <a:endParaRPr lang="nl-NL" dirty="0"/>
+          </a:p>
+          <a:p>
+            <a:pPr lvl="1"/>
             <a:endParaRPr lang="nl-NL" sz="2000" dirty="0"/>
           </a:p>
           <a:p>
@@ -7120,13 +8388,20 @@
     </p:spTree>
     <p:extLst>
       <p:ext uri="{BB962C8B-B14F-4D97-AF65-F5344CB8AC3E}">
-        <p14:creationId xmlns:p14="http://schemas.microsoft.com/office/powerpoint/2010/main" val="2097265463"/>
+        <p14:creationId xmlns:p14="http://schemas.microsoft.com/office/powerpoint/2010/main" val="872027322"/>
       </p:ext>
     </p:extLst>
   </p:cSld>
   <p:clrMapOvr>
     <a:masterClrMapping/>
   </p:clrMapOvr>
+  <p:timing>
+    <p:tnLst>
+      <p:par>
+        <p:cTn id="1" dur="indefinite" restart="never" nodeType="tmRoot"/>
+      </p:par>
+    </p:tnLst>
+  </p:timing>
 </p:sld>
 </file>
 
@@ -7165,7 +8440,7 @@
             <a:pPr algn="ctr"/>
             <a:r>
               <a:rPr lang="nl-NL" sz="6600" dirty="0" smtClean="0"/>
-              <a:t>Planning</a:t>
+              <a:t>Enemies</a:t>
             </a:r>
             <a:endParaRPr lang="nl-NL" sz="6600" dirty="0"/>
           </a:p>
@@ -7181,7 +8456,12 @@
             <p:ph idx="1"/>
           </p:nvPr>
         </p:nvSpPr>
-        <p:spPr/>
+        <p:spPr>
+          <a:xfrm>
+            <a:off x="685801" y="2142067"/>
+            <a:ext cx="1963881" cy="3649133"/>
+          </a:xfrm>
+        </p:spPr>
         <p:txBody>
           <a:bodyPr>
             <a:normAutofit/>
@@ -7189,45 +8469,580 @@
           <a:lstStyle/>
           <a:p>
             <a:r>
-              <a:rPr lang="nl-NL" sz="2000" dirty="0" err="1" smtClean="0"/>
-              <a:t>Backlog</a:t>
-            </a:r>
-            <a:r>
-              <a:rPr lang="nl-NL" sz="2000" dirty="0" smtClean="0"/>
-              <a:t> (Asset-List)</a:t>
-            </a:r>
-          </a:p>
-          <a:p>
-            <a:r>
-              <a:rPr lang="nl-NL" sz="2000" dirty="0" smtClean="0"/>
-              <a:t>Asset-List Met Tijdsinschatting</a:t>
-            </a:r>
-          </a:p>
-          <a:p>
-            <a:r>
-              <a:rPr lang="nl-NL" sz="2000" dirty="0" smtClean="0"/>
-              <a:t>Planning in </a:t>
-            </a:r>
-            <a:r>
-              <a:rPr lang="nl-NL" sz="2000" dirty="0" err="1" smtClean="0"/>
-              <a:t>Trello</a:t>
-            </a:r>
+              <a:rPr lang="en-US" sz="2000" dirty="0" smtClean="0"/>
+              <a:t>Robots</a:t>
+            </a:r>
+          </a:p>
+          <a:p>
+            <a:pPr lvl="1"/>
+            <a:r>
+              <a:rPr lang="en-US" dirty="0" smtClean="0"/>
+              <a:t>Cameras</a:t>
+            </a:r>
+          </a:p>
+          <a:p>
+            <a:pPr lvl="1"/>
+            <a:r>
+              <a:rPr lang="en-US" dirty="0" smtClean="0"/>
+              <a:t>Proxies</a:t>
+            </a:r>
+          </a:p>
+          <a:p>
+            <a:pPr lvl="1"/>
+            <a:r>
+              <a:rPr lang="en-US" dirty="0" smtClean="0"/>
+              <a:t>Turrets</a:t>
+            </a:r>
+          </a:p>
+          <a:p>
+            <a:pPr lvl="1"/>
+            <a:r>
+              <a:rPr lang="en-US" dirty="0" smtClean="0"/>
+              <a:t>Roombas</a:t>
+            </a:r>
+          </a:p>
+          <a:p>
+            <a:pPr lvl="1"/>
             <a:endParaRPr lang="nl-NL" sz="2000" dirty="0" smtClean="0"/>
           </a:p>
           <a:p>
-            <a:r>
-              <a:rPr lang="nl-NL" sz="2000" dirty="0" smtClean="0"/>
-              <a:t>Uitleg Taakverdeling</a:t>
-            </a:r>
-          </a:p>
-          <a:p>
             <a:endParaRPr lang="nl-NL" sz="2000" dirty="0"/>
           </a:p>
           <a:p>
+            <a:endParaRPr lang="nl-NL" sz="2000" dirty="0"/>
+          </a:p>
+        </p:txBody>
+      </p:sp>
+      <p:sp>
+        <p:nvSpPr>
+          <p:cNvPr id="4" name="Tijdelijke aanduiding voor inhoud 2"/>
+          <p:cNvSpPr txBox="1">
+            <a:spLocks/>
+          </p:cNvSpPr>
+          <p:nvPr/>
+        </p:nvSpPr>
+        <p:spPr>
+          <a:xfrm>
+            <a:off x="4163292" y="2142067"/>
+            <a:ext cx="2466107" cy="3649133"/>
+          </a:xfrm>
+          <a:prstGeom prst="rect">
+            <a:avLst/>
+          </a:prstGeom>
+        </p:spPr>
+        <p:txBody>
+          <a:bodyPr vert="horz" lIns="91440" tIns="45720" rIns="91440" bIns="45720" rtlCol="0" anchor="ctr">
+            <a:normAutofit/>
+          </a:bodyPr>
+          <a:lstStyle>
+            <a:lvl1pPr marL="285750" indent="-285750" algn="l" defTabSz="457200" rtl="0" eaLnBrk="1" latinLnBrk="0" hangingPunct="1">
+              <a:spcBef>
+                <a:spcPts val="0"/>
+              </a:spcBef>
+              <a:spcAft>
+                <a:spcPts val="1000"/>
+              </a:spcAft>
+              <a:buClr>
+                <a:schemeClr val="tx1"/>
+              </a:buClr>
+              <a:buSzPct val="100000"/>
+              <a:buFont typeface="Arial"/>
+              <a:buChar char="•"/>
+              <a:defRPr sz="1800" kern="1200" cap="none">
+                <a:solidFill>
+                  <a:schemeClr val="tx1"/>
+                </a:solidFill>
+                <a:effectLst/>
+                <a:latin typeface="+mn-lt"/>
+                <a:ea typeface="+mn-ea"/>
+                <a:cs typeface="+mn-cs"/>
+              </a:defRPr>
+            </a:lvl1pPr>
+            <a:lvl2pPr marL="742950" indent="-285750" algn="l" defTabSz="457200" rtl="0" eaLnBrk="1" latinLnBrk="0" hangingPunct="1">
+              <a:spcBef>
+                <a:spcPts val="0"/>
+              </a:spcBef>
+              <a:spcAft>
+                <a:spcPts val="1000"/>
+              </a:spcAft>
+              <a:buClr>
+                <a:schemeClr val="tx1"/>
+              </a:buClr>
+              <a:buSzPct val="100000"/>
+              <a:buFont typeface="Arial"/>
+              <a:buChar char="•"/>
+              <a:defRPr sz="1600" kern="1200" cap="none">
+                <a:solidFill>
+                  <a:schemeClr val="tx1"/>
+                </a:solidFill>
+                <a:effectLst/>
+                <a:latin typeface="+mn-lt"/>
+                <a:ea typeface="+mn-ea"/>
+                <a:cs typeface="+mn-cs"/>
+              </a:defRPr>
+            </a:lvl2pPr>
+            <a:lvl3pPr marL="1200150" indent="-285750" algn="l" defTabSz="457200" rtl="0" eaLnBrk="1" latinLnBrk="0" hangingPunct="1">
+              <a:spcBef>
+                <a:spcPts val="0"/>
+              </a:spcBef>
+              <a:spcAft>
+                <a:spcPts val="1000"/>
+              </a:spcAft>
+              <a:buClr>
+                <a:schemeClr val="tx1"/>
+              </a:buClr>
+              <a:buSzPct val="100000"/>
+              <a:buFont typeface="Arial"/>
+              <a:buChar char="•"/>
+              <a:defRPr sz="1400" kern="1200" cap="none">
+                <a:solidFill>
+                  <a:schemeClr val="tx1"/>
+                </a:solidFill>
+                <a:effectLst/>
+                <a:latin typeface="+mn-lt"/>
+                <a:ea typeface="+mn-ea"/>
+                <a:cs typeface="+mn-cs"/>
+              </a:defRPr>
+            </a:lvl3pPr>
+            <a:lvl4pPr marL="1543050" indent="-171450" algn="l" defTabSz="457200" rtl="0" eaLnBrk="1" latinLnBrk="0" hangingPunct="1">
+              <a:spcBef>
+                <a:spcPts val="0"/>
+              </a:spcBef>
+              <a:spcAft>
+                <a:spcPts val="1000"/>
+              </a:spcAft>
+              <a:buClr>
+                <a:schemeClr val="tx1"/>
+              </a:buClr>
+              <a:buSzPct val="100000"/>
+              <a:buFont typeface="Arial"/>
+              <a:buChar char="•"/>
+              <a:defRPr sz="1200" kern="1200" cap="none">
+                <a:solidFill>
+                  <a:schemeClr val="tx1"/>
+                </a:solidFill>
+                <a:effectLst/>
+                <a:latin typeface="+mn-lt"/>
+                <a:ea typeface="+mn-ea"/>
+                <a:cs typeface="+mn-cs"/>
+              </a:defRPr>
+            </a:lvl4pPr>
+            <a:lvl5pPr marL="2000250" indent="-171450" algn="l" defTabSz="457200" rtl="0" eaLnBrk="1" latinLnBrk="0" hangingPunct="1">
+              <a:spcBef>
+                <a:spcPts val="0"/>
+              </a:spcBef>
+              <a:spcAft>
+                <a:spcPts val="1000"/>
+              </a:spcAft>
+              <a:buClr>
+                <a:schemeClr val="tx1"/>
+              </a:buClr>
+              <a:buSzPct val="100000"/>
+              <a:buFont typeface="Arial"/>
+              <a:buChar char="•"/>
+              <a:defRPr sz="1200" kern="1200" cap="none">
+                <a:solidFill>
+                  <a:schemeClr val="tx1"/>
+                </a:solidFill>
+                <a:effectLst/>
+                <a:latin typeface="+mn-lt"/>
+                <a:ea typeface="+mn-ea"/>
+                <a:cs typeface="+mn-cs"/>
+              </a:defRPr>
+            </a:lvl5pPr>
+            <a:lvl6pPr marL="2514600" indent="-228600" algn="l" defTabSz="457200" rtl="0" eaLnBrk="1" latinLnBrk="0" hangingPunct="1">
+              <a:spcBef>
+                <a:spcPts val="0"/>
+              </a:spcBef>
+              <a:spcAft>
+                <a:spcPts val="1000"/>
+              </a:spcAft>
+              <a:buClr>
+                <a:schemeClr val="tx1"/>
+              </a:buClr>
+              <a:buSzPct val="100000"/>
+              <a:buFont typeface="Arial"/>
+              <a:buChar char="•"/>
+              <a:defRPr sz="1200" kern="1200" cap="none">
+                <a:solidFill>
+                  <a:schemeClr val="tx1"/>
+                </a:solidFill>
+                <a:effectLst/>
+                <a:latin typeface="+mn-lt"/>
+                <a:ea typeface="+mn-ea"/>
+                <a:cs typeface="+mn-cs"/>
+              </a:defRPr>
+            </a:lvl6pPr>
+            <a:lvl7pPr marL="2971800" indent="-228600" algn="l" defTabSz="457200" rtl="0" eaLnBrk="1" latinLnBrk="0" hangingPunct="1">
+              <a:spcBef>
+                <a:spcPts val="0"/>
+              </a:spcBef>
+              <a:spcAft>
+                <a:spcPts val="1000"/>
+              </a:spcAft>
+              <a:buClr>
+                <a:schemeClr val="tx1"/>
+              </a:buClr>
+              <a:buSzPct val="100000"/>
+              <a:buFont typeface="Arial"/>
+              <a:buChar char="•"/>
+              <a:defRPr sz="1200" kern="1200" cap="none">
+                <a:solidFill>
+                  <a:schemeClr val="tx1"/>
+                </a:solidFill>
+                <a:effectLst/>
+                <a:latin typeface="+mn-lt"/>
+                <a:ea typeface="+mn-ea"/>
+                <a:cs typeface="+mn-cs"/>
+              </a:defRPr>
+            </a:lvl7pPr>
+            <a:lvl8pPr marL="3429000" indent="-228600" algn="l" defTabSz="457200" rtl="0" eaLnBrk="1" latinLnBrk="0" hangingPunct="1">
+              <a:spcBef>
+                <a:spcPts val="0"/>
+              </a:spcBef>
+              <a:spcAft>
+                <a:spcPts val="1000"/>
+              </a:spcAft>
+              <a:buClr>
+                <a:schemeClr val="tx1"/>
+              </a:buClr>
+              <a:buSzPct val="100000"/>
+              <a:buFont typeface="Arial"/>
+              <a:buChar char="•"/>
+              <a:defRPr sz="1200" kern="1200" cap="none">
+                <a:solidFill>
+                  <a:schemeClr val="tx1"/>
+                </a:solidFill>
+                <a:effectLst/>
+                <a:latin typeface="+mn-lt"/>
+                <a:ea typeface="+mn-ea"/>
+                <a:cs typeface="+mn-cs"/>
+              </a:defRPr>
+            </a:lvl8pPr>
+            <a:lvl9pPr marL="3886200" indent="-228600" algn="l" defTabSz="457200" rtl="0" eaLnBrk="1" latinLnBrk="0" hangingPunct="1">
+              <a:spcBef>
+                <a:spcPts val="0"/>
+              </a:spcBef>
+              <a:spcAft>
+                <a:spcPts val="1000"/>
+              </a:spcAft>
+              <a:buClr>
+                <a:schemeClr val="tx1"/>
+              </a:buClr>
+              <a:buSzPct val="100000"/>
+              <a:buFont typeface="Arial"/>
+              <a:buChar char="•"/>
+              <a:defRPr sz="1200" kern="1200" cap="none">
+                <a:solidFill>
+                  <a:schemeClr val="tx1"/>
+                </a:solidFill>
+                <a:effectLst/>
+                <a:latin typeface="+mn-lt"/>
+                <a:ea typeface="+mn-ea"/>
+                <a:cs typeface="+mn-cs"/>
+              </a:defRPr>
+            </a:lvl9pPr>
+          </a:lstStyle>
+          <a:p>
+            <a:r>
+              <a:rPr lang="en-US" sz="2000" dirty="0" smtClean="0"/>
+              <a:t>Livestock</a:t>
+            </a:r>
+          </a:p>
+          <a:p>
+            <a:pPr lvl="1"/>
+            <a:r>
+              <a:rPr lang="en-US" dirty="0" smtClean="0"/>
+              <a:t>Mutated dogs</a:t>
+            </a:r>
+          </a:p>
+          <a:p>
+            <a:pPr lvl="1"/>
+            <a:r>
+              <a:rPr lang="en-US" dirty="0" smtClean="0"/>
+              <a:t>Mutated chickens</a:t>
+            </a:r>
+          </a:p>
+          <a:p>
+            <a:pPr lvl="1"/>
             <a:endParaRPr lang="nl-NL" sz="2000" dirty="0" smtClean="0"/>
           </a:p>
           <a:p>
+            <a:endParaRPr lang="nl-NL" sz="2000" dirty="0" smtClean="0"/>
+          </a:p>
+          <a:p>
+            <a:endParaRPr lang="nl-NL" sz="2000" dirty="0" smtClean="0"/>
+          </a:p>
+          <a:p>
+            <a:endParaRPr lang="nl-NL" sz="2000" dirty="0" smtClean="0"/>
+          </a:p>
+          <a:p>
             <a:endParaRPr lang="nl-NL" sz="2000" dirty="0"/>
+          </a:p>
+        </p:txBody>
+      </p:sp>
+      <p:sp>
+        <p:nvSpPr>
+          <p:cNvPr id="5" name="Tijdelijke aanduiding voor inhoud 2"/>
+          <p:cNvSpPr txBox="1">
+            <a:spLocks/>
+          </p:cNvSpPr>
+          <p:nvPr/>
+        </p:nvSpPr>
+        <p:spPr>
+          <a:xfrm>
+            <a:off x="7640785" y="2142067"/>
+            <a:ext cx="2635824" cy="3649133"/>
+          </a:xfrm>
+          <a:prstGeom prst="rect">
+            <a:avLst/>
+          </a:prstGeom>
+        </p:spPr>
+        <p:txBody>
+          <a:bodyPr vert="horz" lIns="91440" tIns="45720" rIns="91440" bIns="45720" rtlCol="0" anchor="ctr">
+            <a:normAutofit/>
+          </a:bodyPr>
+          <a:lstStyle>
+            <a:lvl1pPr marL="285750" indent="-285750" algn="l" defTabSz="457200" rtl="0" eaLnBrk="1" latinLnBrk="0" hangingPunct="1">
+              <a:spcBef>
+                <a:spcPts val="0"/>
+              </a:spcBef>
+              <a:spcAft>
+                <a:spcPts val="1000"/>
+              </a:spcAft>
+              <a:buClr>
+                <a:schemeClr val="tx1"/>
+              </a:buClr>
+              <a:buSzPct val="100000"/>
+              <a:buFont typeface="Arial"/>
+              <a:buChar char="•"/>
+              <a:defRPr sz="1800" kern="1200" cap="none">
+                <a:solidFill>
+                  <a:schemeClr val="tx1"/>
+                </a:solidFill>
+                <a:effectLst/>
+                <a:latin typeface="+mn-lt"/>
+                <a:ea typeface="+mn-ea"/>
+                <a:cs typeface="+mn-cs"/>
+              </a:defRPr>
+            </a:lvl1pPr>
+            <a:lvl2pPr marL="742950" indent="-285750" algn="l" defTabSz="457200" rtl="0" eaLnBrk="1" latinLnBrk="0" hangingPunct="1">
+              <a:spcBef>
+                <a:spcPts val="0"/>
+              </a:spcBef>
+              <a:spcAft>
+                <a:spcPts val="1000"/>
+              </a:spcAft>
+              <a:buClr>
+                <a:schemeClr val="tx1"/>
+              </a:buClr>
+              <a:buSzPct val="100000"/>
+              <a:buFont typeface="Arial"/>
+              <a:buChar char="•"/>
+              <a:defRPr sz="1600" kern="1200" cap="none">
+                <a:solidFill>
+                  <a:schemeClr val="tx1"/>
+                </a:solidFill>
+                <a:effectLst/>
+                <a:latin typeface="+mn-lt"/>
+                <a:ea typeface="+mn-ea"/>
+                <a:cs typeface="+mn-cs"/>
+              </a:defRPr>
+            </a:lvl2pPr>
+            <a:lvl3pPr marL="1200150" indent="-285750" algn="l" defTabSz="457200" rtl="0" eaLnBrk="1" latinLnBrk="0" hangingPunct="1">
+              <a:spcBef>
+                <a:spcPts val="0"/>
+              </a:spcBef>
+              <a:spcAft>
+                <a:spcPts val="1000"/>
+              </a:spcAft>
+              <a:buClr>
+                <a:schemeClr val="tx1"/>
+              </a:buClr>
+              <a:buSzPct val="100000"/>
+              <a:buFont typeface="Arial"/>
+              <a:buChar char="•"/>
+              <a:defRPr sz="1400" kern="1200" cap="none">
+                <a:solidFill>
+                  <a:schemeClr val="tx1"/>
+                </a:solidFill>
+                <a:effectLst/>
+                <a:latin typeface="+mn-lt"/>
+                <a:ea typeface="+mn-ea"/>
+                <a:cs typeface="+mn-cs"/>
+              </a:defRPr>
+            </a:lvl3pPr>
+            <a:lvl4pPr marL="1543050" indent="-171450" algn="l" defTabSz="457200" rtl="0" eaLnBrk="1" latinLnBrk="0" hangingPunct="1">
+              <a:spcBef>
+                <a:spcPts val="0"/>
+              </a:spcBef>
+              <a:spcAft>
+                <a:spcPts val="1000"/>
+              </a:spcAft>
+              <a:buClr>
+                <a:schemeClr val="tx1"/>
+              </a:buClr>
+              <a:buSzPct val="100000"/>
+              <a:buFont typeface="Arial"/>
+              <a:buChar char="•"/>
+              <a:defRPr sz="1200" kern="1200" cap="none">
+                <a:solidFill>
+                  <a:schemeClr val="tx1"/>
+                </a:solidFill>
+                <a:effectLst/>
+                <a:latin typeface="+mn-lt"/>
+                <a:ea typeface="+mn-ea"/>
+                <a:cs typeface="+mn-cs"/>
+              </a:defRPr>
+            </a:lvl4pPr>
+            <a:lvl5pPr marL="2000250" indent="-171450" algn="l" defTabSz="457200" rtl="0" eaLnBrk="1" latinLnBrk="0" hangingPunct="1">
+              <a:spcBef>
+                <a:spcPts val="0"/>
+              </a:spcBef>
+              <a:spcAft>
+                <a:spcPts val="1000"/>
+              </a:spcAft>
+              <a:buClr>
+                <a:schemeClr val="tx1"/>
+              </a:buClr>
+              <a:buSzPct val="100000"/>
+              <a:buFont typeface="Arial"/>
+              <a:buChar char="•"/>
+              <a:defRPr sz="1200" kern="1200" cap="none">
+                <a:solidFill>
+                  <a:schemeClr val="tx1"/>
+                </a:solidFill>
+                <a:effectLst/>
+                <a:latin typeface="+mn-lt"/>
+                <a:ea typeface="+mn-ea"/>
+                <a:cs typeface="+mn-cs"/>
+              </a:defRPr>
+            </a:lvl5pPr>
+            <a:lvl6pPr marL="2514600" indent="-228600" algn="l" defTabSz="457200" rtl="0" eaLnBrk="1" latinLnBrk="0" hangingPunct="1">
+              <a:spcBef>
+                <a:spcPts val="0"/>
+              </a:spcBef>
+              <a:spcAft>
+                <a:spcPts val="1000"/>
+              </a:spcAft>
+              <a:buClr>
+                <a:schemeClr val="tx1"/>
+              </a:buClr>
+              <a:buSzPct val="100000"/>
+              <a:buFont typeface="Arial"/>
+              <a:buChar char="•"/>
+              <a:defRPr sz="1200" kern="1200" cap="none">
+                <a:solidFill>
+                  <a:schemeClr val="tx1"/>
+                </a:solidFill>
+                <a:effectLst/>
+                <a:latin typeface="+mn-lt"/>
+                <a:ea typeface="+mn-ea"/>
+                <a:cs typeface="+mn-cs"/>
+              </a:defRPr>
+            </a:lvl6pPr>
+            <a:lvl7pPr marL="2971800" indent="-228600" algn="l" defTabSz="457200" rtl="0" eaLnBrk="1" latinLnBrk="0" hangingPunct="1">
+              <a:spcBef>
+                <a:spcPts val="0"/>
+              </a:spcBef>
+              <a:spcAft>
+                <a:spcPts val="1000"/>
+              </a:spcAft>
+              <a:buClr>
+                <a:schemeClr val="tx1"/>
+              </a:buClr>
+              <a:buSzPct val="100000"/>
+              <a:buFont typeface="Arial"/>
+              <a:buChar char="•"/>
+              <a:defRPr sz="1200" kern="1200" cap="none">
+                <a:solidFill>
+                  <a:schemeClr val="tx1"/>
+                </a:solidFill>
+                <a:effectLst/>
+                <a:latin typeface="+mn-lt"/>
+                <a:ea typeface="+mn-ea"/>
+                <a:cs typeface="+mn-cs"/>
+              </a:defRPr>
+            </a:lvl7pPr>
+            <a:lvl8pPr marL="3429000" indent="-228600" algn="l" defTabSz="457200" rtl="0" eaLnBrk="1" latinLnBrk="0" hangingPunct="1">
+              <a:spcBef>
+                <a:spcPts val="0"/>
+              </a:spcBef>
+              <a:spcAft>
+                <a:spcPts val="1000"/>
+              </a:spcAft>
+              <a:buClr>
+                <a:schemeClr val="tx1"/>
+              </a:buClr>
+              <a:buSzPct val="100000"/>
+              <a:buFont typeface="Arial"/>
+              <a:buChar char="•"/>
+              <a:defRPr sz="1200" kern="1200" cap="none">
+                <a:solidFill>
+                  <a:schemeClr val="tx1"/>
+                </a:solidFill>
+                <a:effectLst/>
+                <a:latin typeface="+mn-lt"/>
+                <a:ea typeface="+mn-ea"/>
+                <a:cs typeface="+mn-cs"/>
+              </a:defRPr>
+            </a:lvl8pPr>
+            <a:lvl9pPr marL="3886200" indent="-228600" algn="l" defTabSz="457200" rtl="0" eaLnBrk="1" latinLnBrk="0" hangingPunct="1">
+              <a:spcBef>
+                <a:spcPts val="0"/>
+              </a:spcBef>
+              <a:spcAft>
+                <a:spcPts val="1000"/>
+              </a:spcAft>
+              <a:buClr>
+                <a:schemeClr val="tx1"/>
+              </a:buClr>
+              <a:buSzPct val="100000"/>
+              <a:buFont typeface="Arial"/>
+              <a:buChar char="•"/>
+              <a:defRPr sz="1200" kern="1200" cap="none">
+                <a:solidFill>
+                  <a:schemeClr val="tx1"/>
+                </a:solidFill>
+                <a:effectLst/>
+                <a:latin typeface="+mn-lt"/>
+                <a:ea typeface="+mn-ea"/>
+                <a:cs typeface="+mn-cs"/>
+              </a:defRPr>
+            </a:lvl9pPr>
+          </a:lstStyle>
+          <a:p>
+            <a:r>
+              <a:rPr lang="en-US" sz="2000" dirty="0" smtClean="0"/>
+              <a:t>Special</a:t>
+            </a:r>
+          </a:p>
+          <a:p>
+            <a:pPr lvl="1"/>
+            <a:r>
+              <a:rPr lang="en-US" dirty="0" smtClean="0"/>
+              <a:t>Xenomorphic alien</a:t>
+            </a:r>
+          </a:p>
+          <a:p>
+            <a:pPr lvl="1"/>
+            <a:r>
+              <a:rPr lang="en-US" dirty="0" smtClean="0"/>
+              <a:t>Carnivorous plants</a:t>
+            </a:r>
+            <a:endParaRPr lang="nl-NL" sz="2000" dirty="0" smtClean="0"/>
+          </a:p>
+          <a:p>
+            <a:endParaRPr lang="nl-NL" sz="2000" dirty="0" smtClean="0"/>
+          </a:p>
+          <a:p>
+            <a:endParaRPr lang="nl-NL" sz="2000" dirty="0" smtClean="0"/>
+          </a:p>
+          <a:p>
+            <a:endParaRPr lang="nl-NL" sz="2000" dirty="0" smtClean="0"/>
+          </a:p>
+          <a:p>
+            <a:endParaRPr lang="nl-NL" sz="2000" dirty="0" smtClean="0"/>
           </a:p>
           <a:p>
             <a:endParaRPr lang="nl-NL" sz="2000" dirty="0"/>
@@ -7237,13 +9052,20 @@
     </p:spTree>
     <p:extLst>
       <p:ext uri="{BB962C8B-B14F-4D97-AF65-F5344CB8AC3E}">
-        <p14:creationId xmlns:p14="http://schemas.microsoft.com/office/powerpoint/2010/main" val="3671801935"/>
+        <p14:creationId xmlns:p14="http://schemas.microsoft.com/office/powerpoint/2010/main" val="3828655305"/>
       </p:ext>
     </p:extLst>
   </p:cSld>
   <p:clrMapOvr>
     <a:masterClrMapping/>
   </p:clrMapOvr>
+  <p:timing>
+    <p:tnLst>
+      <p:par>
+        <p:cTn id="1" dur="indefinite" restart="never" nodeType="tmRoot"/>
+      </p:par>
+    </p:tnLst>
+  </p:timing>
 </p:sld>
 </file>
 

</xml_diff>

<commit_message>
Wat moet er nog in?
Ik heb een word document geadd van wat er nog in moet komen enzo. En heb
de powerpoint beetje aangepast en heb mijn UML afbeeldingen ook maar
geupload voor geval iemand ze wilt gebruiken ofzo
</commit_message>
<xml_diff>
--- a/Presentatie/1. Concept Art Fase/Presentatie Concept Fase.pptx
+++ b/Presentatie/1. Concept Art Fase/Presentatie Concept Fase.pptx
@@ -6175,11 +6175,7 @@
           <a:p>
             <a:r>
               <a:rPr lang="nl-NL" sz="2000" dirty="0" smtClean="0"/>
-              <a:t>Onderbouwing </a:t>
-            </a:r>
-            <a:r>
-              <a:rPr lang="nl-NL" sz="2000" dirty="0" smtClean="0"/>
-              <a:t>Keuzen</a:t>
+              <a:t>Onderbouwing Keuzen</a:t>
             </a:r>
           </a:p>
           <a:p>
@@ -6286,11 +6282,7 @@
           <a:p>
             <a:r>
               <a:rPr lang="nl-NL" sz="2000" dirty="0" smtClean="0"/>
-              <a:t>Asset-List Met </a:t>
-            </a:r>
-            <a:r>
-              <a:rPr lang="nl-NL" sz="2000" dirty="0" smtClean="0"/>
-              <a:t>Tijdsinschatting</a:t>
+              <a:t>Asset-List Met Tijdsinschatting</a:t>
             </a:r>
             <a:endParaRPr lang="nl-NL" sz="2000" dirty="0"/>
           </a:p>
@@ -6387,11 +6379,7 @@
           <a:p>
             <a:r>
               <a:rPr lang="nl-NL" sz="2000" dirty="0" smtClean="0"/>
-              <a:t>Planning </a:t>
-            </a:r>
-            <a:r>
-              <a:rPr lang="nl-NL" sz="2000" dirty="0" smtClean="0"/>
-              <a:t>in Trello</a:t>
+              <a:t>Planning in Trello</a:t>
             </a:r>
           </a:p>
           <a:p>
@@ -6498,14 +6486,7 @@
             </a:r>
             <a:r>
               <a:rPr lang="nl-NL" sz="2000" dirty="0" smtClean="0"/>
-              <a:t>Zones</a:t>
-            </a:r>
-            <a:endParaRPr lang="nl-NL" sz="2000" dirty="0" smtClean="0"/>
-          </a:p>
-          <a:p>
-            <a:r>
-              <a:rPr lang="nl-NL" sz="2000" dirty="0" smtClean="0"/>
-              <a:t>Uitleg Puzzle</a:t>
+              <a:t>Puzzle</a:t>
             </a:r>
           </a:p>
           <a:p>
@@ -6531,11 +6512,7 @@
           <a:p>
             <a:r>
               <a:rPr lang="nl-NL" sz="2000" dirty="0" smtClean="0"/>
-              <a:t>Uitleg Gameflow Van Begin Tot </a:t>
-            </a:r>
-            <a:r>
-              <a:rPr lang="nl-NL" sz="2000" dirty="0" smtClean="0"/>
-              <a:t>Eind</a:t>
+              <a:t>Uitleg Gameflow Van Begin Tot Eind</a:t>
             </a:r>
           </a:p>
           <a:p>
@@ -6561,7 +6538,11 @@
             </a:r>
             <a:r>
               <a:rPr lang="en-US" sz="2000" dirty="0" smtClean="0"/>
-              <a:t> (diverse </a:t>
+              <a:t> </a:t>
+            </a:r>
+            <a:r>
+              <a:rPr lang="en-US" sz="2000" dirty="0" smtClean="0"/>
+              <a:t>(diverse </a:t>
             </a:r>
             <a:r>
               <a:rPr lang="en-US" sz="2000" dirty="0" err="1" smtClean="0"/>
@@ -6571,10 +6552,12 @@
               <a:rPr lang="en-US" sz="2000" dirty="0" smtClean="0"/>
               <a:t>.)</a:t>
             </a:r>
-            <a:endParaRPr lang="nl-NL" sz="2000" dirty="0"/>
-          </a:p>
-          <a:p>
-            <a:endParaRPr lang="nl-NL" sz="2000" dirty="0"/>
+          </a:p>
+          <a:p>
+            <a:endParaRPr lang="en-US" sz="2000" dirty="0"/>
+          </a:p>
+          <a:p>
+            <a:endParaRPr lang="en-US" sz="2000" dirty="0" smtClean="0"/>
           </a:p>
           <a:p>
             <a:endParaRPr lang="nl-NL" sz="2000" dirty="0"/>
@@ -7266,7 +7249,6 @@
               <a:rPr lang="nl-NL" sz="2000" dirty="0" smtClean="0"/>
               <a:t>Einddoel</a:t>
             </a:r>
-            <a:endParaRPr lang="nl-NL" sz="2000" dirty="0" smtClean="0"/>
           </a:p>
           <a:p>
             <a:r>
@@ -7511,31 +7493,83 @@
         </p:nvSpPr>
         <p:spPr>
           <a:xfrm>
-            <a:off x="685801" y="2147977"/>
-            <a:ext cx="10131425" cy="3643223"/>
+            <a:off x="685801" y="2065867"/>
+            <a:ext cx="10131425" cy="4367123"/>
           </a:xfrm>
         </p:spPr>
         <p:txBody>
-          <a:bodyPr/>
+          <a:bodyPr>
+            <a:normAutofit fontScale="92500" lnSpcReduction="20000"/>
+          </a:bodyPr>
           <a:lstStyle/>
           <a:p>
             <a:r>
               <a:rPr lang="nl-NL" sz="2000" dirty="0" smtClean="0"/>
-              <a:t>GDD</a:t>
-            </a:r>
-          </a:p>
-          <a:p>
+              <a:t>GDD					</a:t>
+            </a:r>
+          </a:p>
+          <a:p>
+            <a:r>
+              <a:rPr lang="en-US" sz="2000" dirty="0" err="1" smtClean="0"/>
+              <a:t>Introstory</a:t>
+            </a:r>
+            <a:r>
+              <a:rPr lang="en-US" sz="2000" dirty="0" smtClean="0"/>
+              <a:t>			</a:t>
+            </a:r>
+          </a:p>
+          <a:p>
+            <a:r>
+              <a:rPr lang="en-US" sz="2000" dirty="0" err="1" smtClean="0"/>
+              <a:t>Uitleg</a:t>
+            </a:r>
+            <a:r>
+              <a:rPr lang="en-US" sz="2000" dirty="0" smtClean="0"/>
+              <a:t> Zones	</a:t>
+            </a:r>
+          </a:p>
+          <a:p>
+            <a:r>
+              <a:rPr lang="en-US" sz="2000" dirty="0" smtClean="0"/>
+              <a:t>Game Mechanics</a:t>
+            </a:r>
+          </a:p>
+          <a:p>
+            <a:r>
+              <a:rPr lang="en-US" sz="2000" dirty="0" smtClean="0"/>
+              <a:t>Enemies</a:t>
+            </a:r>
+          </a:p>
+          <a:p>
+            <a:r>
+              <a:rPr lang="en-US" sz="2000" dirty="0" err="1" smtClean="0"/>
+              <a:t>Creativiteit</a:t>
+            </a:r>
+            <a:endParaRPr lang="nl-NL" sz="2000" dirty="0" smtClean="0"/>
+          </a:p>
+          <a:p>
+            <a:r>
+              <a:rPr lang="nl-NL" sz="2000" dirty="0" smtClean="0"/>
+              <a:t>Art </a:t>
+            </a:r>
             <a:r>
               <a:rPr lang="nl-NL" sz="2000" dirty="0" err="1" smtClean="0"/>
-              <a:t>Artstyle</a:t>
+              <a:t>style</a:t>
             </a:r>
             <a:endParaRPr lang="nl-NL" sz="2000" dirty="0" smtClean="0"/>
           </a:p>
           <a:p>
             <a:r>
-              <a:rPr lang="nl-NL" sz="2000" dirty="0" smtClean="0"/>
-              <a:t>Planning</a:t>
-            </a:r>
+              <a:rPr lang="en-US" sz="2000" dirty="0" smtClean="0"/>
+              <a:t>Backlog</a:t>
+            </a:r>
+          </a:p>
+          <a:p>
+            <a:r>
+              <a:rPr lang="en-US" sz="2000" dirty="0" smtClean="0"/>
+              <a:t>Trello</a:t>
+            </a:r>
+            <a:endParaRPr lang="nl-NL" sz="2000" dirty="0" smtClean="0"/>
           </a:p>
           <a:p>
             <a:r>
@@ -7554,11 +7588,6 @@
               <a:rPr lang="nl-NL" sz="2000" dirty="0" smtClean="0"/>
               <a:t>Doel</a:t>
             </a:r>
-          </a:p>
-          <a:p>
-            <a:endParaRPr lang="nl-NL" sz="2000" dirty="0"/>
-          </a:p>
-          <a:p>
             <a:endParaRPr lang="nl-NL" sz="2000" dirty="0" smtClean="0"/>
           </a:p>
         </p:txBody>
@@ -7670,13 +7699,8 @@
           <a:p>
             <a:r>
               <a:rPr lang="nl-NL" sz="2000" dirty="0" smtClean="0"/>
-              <a:t>Unique Aspect </a:t>
-            </a:r>
-            <a:r>
-              <a:rPr lang="nl-NL" sz="2000" dirty="0" smtClean="0"/>
-              <a:t>Game</a:t>
-            </a:r>
-            <a:endParaRPr lang="nl-NL" sz="2000" dirty="0" smtClean="0"/>
+              <a:t>Unique Aspect Game</a:t>
+            </a:r>
           </a:p>
           <a:p>
             <a:r>

</xml_diff>